<commit_message>
Progress on reworking presentation for dotNetConf
</commit_message>
<xml_diff>
--- a/TestDrivingDotNet.pptx
+++ b/TestDrivingDotNet.pptx
@@ -509,7 +509,7 @@
               <a:pPr>
                 <a:defRPr/>
               </a:pPr>
-              <a:t>4/15/2013</a:t>
+              <a:t>4/16/2013</a:t>
             </a:fld>
             <a:endParaRPr lang="en-US"/>
           </a:p>
@@ -3370,7 +3370,7 @@
             <a:prstTxWarp prst="textNoShape">
               <a:avLst/>
             </a:prstTxWarp>
-            <a:normAutofit fontScale="55000" lnSpcReduction="20000"/>
+            <a:normAutofit fontScale="77500" lnSpcReduction="20000"/>
           </a:bodyPr>
           <a:lstStyle/>
           <a:p>
@@ -3390,7 +3390,30 @@
             </a:pPr>
             <a:r>
               <a:rPr lang="en-US" sz="1400" dirty="0" smtClean="0"/>
-              <a:t>Must accept to 2 decimals, and return a decimal</a:t>
+              <a:t>Must accept to 2 decimals, and </a:t>
+            </a:r>
+            <a:r>
+              <a:rPr lang="en-US" sz="1400" dirty="0" smtClean="0"/>
+              <a:t>return</a:t>
+            </a:r>
+            <a:r>
+              <a:rPr lang="en-US" sz="1400" baseline="0" dirty="0" smtClean="0"/>
+              <a:t> the sum of the two inputs</a:t>
+            </a:r>
+            <a:endParaRPr lang="en-US" sz="1400" dirty="0" smtClean="0"/>
+          </a:p>
+          <a:p>
+            <a:pPr marL="742950" lvl="1" indent="-285750" algn="l">
+              <a:buFont typeface="Arial" pitchFamily="34" charset="0"/>
+              <a:buChar char="•"/>
+            </a:pPr>
+            <a:r>
+              <a:rPr lang="en-US" sz="1400" dirty="0" smtClean="0"/>
+              <a:t>Write </a:t>
+            </a:r>
+            <a:r>
+              <a:rPr lang="en-US" sz="1400" dirty="0" smtClean="0"/>
+              <a:t>a test to make sure return value is a decimal</a:t>
             </a:r>
           </a:p>
           <a:p>
@@ -3400,8 +3423,13 @@
             </a:pPr>
             <a:r>
               <a:rPr lang="en-US" sz="1400" dirty="0" smtClean="0"/>
-              <a:t>Accepting input parameters is something I personally DO NOT test as it is set by method signature and causes a compiler error if there are conflicts</a:t>
-            </a:r>
+              <a:t>Write test with standard assert </a:t>
+            </a:r>
+            <a:r>
+              <a:rPr lang="en-US" sz="1400" b="1" dirty="0" smtClean="0"/>
+              <a:t>tdd1</a:t>
+            </a:r>
+            <a:endParaRPr lang="en-US" sz="2400" dirty="0" smtClean="0"/>
           </a:p>
           <a:p>
             <a:pPr marL="1200150" lvl="2" indent="-285750" algn="l">
@@ -3410,8 +3438,158 @@
             </a:pPr>
             <a:r>
               <a:rPr lang="en-US" sz="1400" dirty="0" smtClean="0"/>
-              <a:t>I do test that the output is what I expect because of the incorrect usage of VAR!  </a:t>
-            </a:r>
+              <a:t>Run </a:t>
+            </a:r>
+            <a:r>
+              <a:rPr lang="en-US" sz="1400" dirty="0" smtClean="0"/>
+              <a:t>it – it fails because we don’t have the</a:t>
+            </a:r>
+            <a:r>
+              <a:rPr lang="en-US" sz="1400" baseline="0" dirty="0" smtClean="0"/>
+              <a:t> method implemented…</a:t>
+            </a:r>
+            <a:r>
+              <a:rPr lang="en-US" sz="1400" b="1" baseline="0" dirty="0" smtClean="0"/>
+              <a:t>this is our RED</a:t>
+            </a:r>
+          </a:p>
+          <a:p>
+            <a:pPr marL="1200150" lvl="2" indent="-285750" algn="l">
+              <a:buFont typeface="Arial" pitchFamily="34" charset="0"/>
+              <a:buChar char="•"/>
+            </a:pPr>
+            <a:r>
+              <a:rPr lang="en-US" sz="1400" b="0" baseline="0" dirty="0" smtClean="0"/>
+              <a:t>Implement method…</a:t>
+            </a:r>
+            <a:r>
+              <a:rPr lang="en-US" sz="1400" b="1" baseline="0" dirty="0" smtClean="0"/>
+              <a:t>have it just return 0</a:t>
+            </a:r>
+            <a:r>
+              <a:rPr lang="en-US" sz="1400" b="0" baseline="0" dirty="0" smtClean="0"/>
+              <a:t>…that is all we need to get the test to pass.</a:t>
+            </a:r>
+          </a:p>
+          <a:p>
+            <a:pPr marL="1200150" lvl="2" indent="-285750" algn="l">
+              <a:buFont typeface="Arial" pitchFamily="34" charset="0"/>
+              <a:buChar char="•"/>
+            </a:pPr>
+            <a:r>
+              <a:rPr lang="en-US" sz="1400" b="0" baseline="0" dirty="0" smtClean="0"/>
+              <a:t>Run test…it’s </a:t>
+            </a:r>
+            <a:r>
+              <a:rPr lang="en-US" sz="1400" b="1" baseline="0" dirty="0" smtClean="0"/>
+              <a:t>Green…great…but…</a:t>
+            </a:r>
+            <a:endParaRPr lang="en-US" sz="1400" b="0" dirty="0" smtClean="0"/>
+          </a:p>
+          <a:p>
+            <a:pPr marL="1200150" lvl="2" indent="-285750" algn="l">
+              <a:buFont typeface="Arial" pitchFamily="34" charset="0"/>
+              <a:buChar char="•"/>
+            </a:pPr>
+            <a:r>
+              <a:rPr lang="en-US" sz="1400" dirty="0" smtClean="0"/>
+              <a:t>Talk about readability</a:t>
+            </a:r>
+          </a:p>
+          <a:p>
+            <a:pPr marL="1200150" lvl="2" indent="-285750" algn="l">
+              <a:buFont typeface="Arial" pitchFamily="34" charset="0"/>
+              <a:buChar char="•"/>
+            </a:pPr>
+            <a:r>
+              <a:rPr lang="en-US" sz="1400" dirty="0" smtClean="0"/>
+              <a:t>Talk about NuGet</a:t>
+            </a:r>
+          </a:p>
+          <a:p>
+            <a:pPr marL="1200150" lvl="2" indent="-285750" algn="l">
+              <a:buFont typeface="Arial" pitchFamily="34" charset="0"/>
+              <a:buChar char="•"/>
+            </a:pPr>
+            <a:r>
+              <a:rPr lang="en-US" sz="1400" dirty="0" err="1" smtClean="0"/>
+              <a:t>FluentAssertions</a:t>
+            </a:r>
+            <a:endParaRPr lang="en-US" sz="1400" dirty="0" smtClean="0"/>
+          </a:p>
+          <a:p>
+            <a:pPr marL="2114550" lvl="4" indent="-285750" algn="l">
+              <a:buFont typeface="Arial" pitchFamily="34" charset="0"/>
+              <a:buChar char="•"/>
+            </a:pPr>
+            <a:r>
+              <a:rPr lang="en-US" sz="1400" dirty="0" smtClean="0"/>
+              <a:t> </a:t>
+            </a:r>
+            <a:r>
+              <a:rPr lang="en-US" sz="1200" kern="1200" dirty="0" err="1" smtClean="0">
+                <a:solidFill>
+                  <a:schemeClr val="tx1"/>
+                </a:solidFill>
+                <a:effectLst/>
+                <a:latin typeface="+mn-lt"/>
+                <a:ea typeface="+mn-ea"/>
+                <a:cs typeface="+mn-cs"/>
+              </a:rPr>
+              <a:t>result.Should</a:t>
+            </a:r>
+            <a:r>
+              <a:rPr lang="en-US" dirty="0" smtClean="0"/>
+              <a:t>()</a:t>
+            </a:r>
+            <a:r>
+              <a:rPr lang="en-US" sz="1200" kern="1200" dirty="0" smtClean="0">
+                <a:solidFill>
+                  <a:schemeClr val="tx1"/>
+                </a:solidFill>
+                <a:effectLst/>
+                <a:latin typeface="+mn-lt"/>
+                <a:ea typeface="+mn-ea"/>
+                <a:cs typeface="+mn-cs"/>
+              </a:rPr>
+              <a:t>.Be</a:t>
+            </a:r>
+            <a:r>
+              <a:rPr lang="en-US" dirty="0" smtClean="0"/>
+              <a:t>(</a:t>
+            </a:r>
+            <a:r>
+              <a:rPr lang="en-US" sz="1200" kern="1200" dirty="0" smtClean="0">
+                <a:solidFill>
+                  <a:schemeClr val="tx1"/>
+                </a:solidFill>
+                <a:effectLst/>
+                <a:latin typeface="+mn-lt"/>
+                <a:ea typeface="+mn-ea"/>
+                <a:cs typeface="+mn-cs"/>
+              </a:rPr>
+              <a:t>12</a:t>
+            </a:r>
+            <a:r>
+              <a:rPr lang="en-US" dirty="0" smtClean="0"/>
+              <a:t>); </a:t>
+            </a:r>
+            <a:r>
+              <a:rPr lang="en-US" sz="1400" dirty="0" smtClean="0"/>
+              <a:t> </a:t>
+            </a:r>
+            <a:endParaRPr lang="en-US" sz="1400" dirty="0" smtClean="0"/>
+          </a:p>
+          <a:p>
+            <a:pPr marL="1200150" lvl="2" indent="-285750" algn="l">
+              <a:buFont typeface="Arial" pitchFamily="34" charset="0"/>
+              <a:buChar char="•"/>
+            </a:pPr>
+            <a:r>
+              <a:rPr lang="en-US" sz="1400" b="1" dirty="0" smtClean="0"/>
+              <a:t>Refactor</a:t>
+            </a:r>
+            <a:endParaRPr lang="en-US" sz="1400" b="1" dirty="0" smtClean="0"/>
           </a:p>
           <a:p>
             <a:pPr marL="1657350" lvl="3" indent="-285750" algn="l">
@@ -3420,526 +3598,9 @@
             </a:pPr>
             <a:r>
               <a:rPr lang="en-US" sz="1400" dirty="0" smtClean="0"/>
-              <a:t>VAR IS BAD</a:t>
-            </a:r>
-          </a:p>
-          <a:p>
-            <a:pPr marL="742950" lvl="1" indent="-285750" algn="l">
-              <a:buFont typeface="Arial" pitchFamily="34" charset="0"/>
-              <a:buChar char="•"/>
-            </a:pPr>
-            <a:r>
-              <a:rPr lang="en-US" sz="1400" dirty="0" smtClean="0"/>
-              <a:t>Write a test to make sure return value is a decimal</a:t>
-            </a:r>
-          </a:p>
-          <a:p>
-            <a:pPr marL="1200150" lvl="2" indent="-285750" algn="l">
-              <a:buFont typeface="Arial" pitchFamily="34" charset="0"/>
-              <a:buChar char="•"/>
-            </a:pPr>
-            <a:r>
-              <a:rPr lang="en-US" sz="1400" dirty="0" smtClean="0"/>
-              <a:t>Write test with standard </a:t>
-            </a:r>
-            <a:r>
-              <a:rPr lang="en-US" sz="1400" smtClean="0"/>
-              <a:t>assert </a:t>
-            </a:r>
-            <a:r>
-              <a:rPr lang="en-US" sz="1400" b="1" smtClean="0"/>
-              <a:t>tdd1</a:t>
+              <a:t>Nothing really to refactor</a:t>
             </a:r>
             <a:endParaRPr lang="en-US" sz="1400" dirty="0" smtClean="0"/>
-          </a:p>
-          <a:p>
-            <a:pPr lvl="3"/>
-            <a:r>
-              <a:rPr lang="en-US" sz="1200" kern="1200" baseline="0" dirty="0" smtClean="0">
-                <a:solidFill>
-                  <a:schemeClr val="tx1"/>
-                </a:solidFill>
-                <a:latin typeface="+mn-lt"/>
-                <a:ea typeface="+mn-ea"/>
-                <a:cs typeface="+mn-cs"/>
-              </a:rPr>
-              <a:t>        </a:t>
-            </a:r>
-            <a:r>
-              <a:rPr lang="en-US" sz="1200" kern="1200" dirty="0" smtClean="0">
-                <a:solidFill>
-                  <a:schemeClr val="tx1"/>
-                </a:solidFill>
-                <a:latin typeface="+mn-lt"/>
-                <a:ea typeface="+mn-ea"/>
-                <a:cs typeface="+mn-cs"/>
-              </a:rPr>
-              <a:t>[</a:t>
-            </a:r>
-            <a:r>
-              <a:rPr lang="en-US" sz="1200" kern="1200" dirty="0" err="1" smtClean="0">
-                <a:solidFill>
-                  <a:schemeClr val="tx1"/>
-                </a:solidFill>
-                <a:latin typeface="+mn-lt"/>
-                <a:ea typeface="+mn-ea"/>
-                <a:cs typeface="+mn-cs"/>
-              </a:rPr>
-              <a:t>TestMethod</a:t>
-            </a:r>
-            <a:r>
-              <a:rPr lang="en-US" sz="1200" kern="1200" dirty="0" smtClean="0">
-                <a:solidFill>
-                  <a:schemeClr val="tx1"/>
-                </a:solidFill>
-                <a:latin typeface="+mn-lt"/>
-                <a:ea typeface="+mn-ea"/>
-                <a:cs typeface="+mn-cs"/>
-              </a:rPr>
-              <a:t>]</a:t>
-            </a:r>
-          </a:p>
-          <a:p>
-            <a:pPr lvl="3"/>
-            <a:r>
-              <a:rPr lang="en-US" sz="1200" kern="1200" dirty="0" smtClean="0">
-                <a:solidFill>
-                  <a:schemeClr val="tx1"/>
-                </a:solidFill>
-                <a:latin typeface="+mn-lt"/>
-                <a:ea typeface="+mn-ea"/>
-                <a:cs typeface="+mn-cs"/>
-              </a:rPr>
-              <a:t>        public void </a:t>
-            </a:r>
-            <a:r>
-              <a:rPr lang="en-US" sz="1200" kern="1200" dirty="0" err="1" smtClean="0">
-                <a:solidFill>
-                  <a:schemeClr val="tx1"/>
-                </a:solidFill>
-                <a:latin typeface="+mn-lt"/>
-                <a:ea typeface="+mn-ea"/>
-                <a:cs typeface="+mn-cs"/>
-              </a:rPr>
-              <a:t>Add_ShouldReturn_Decimal</a:t>
-            </a:r>
-            <a:r>
-              <a:rPr lang="en-US" sz="1200" kern="1200" dirty="0" smtClean="0">
-                <a:solidFill>
-                  <a:schemeClr val="tx1"/>
-                </a:solidFill>
-                <a:latin typeface="+mn-lt"/>
-                <a:ea typeface="+mn-ea"/>
-                <a:cs typeface="+mn-cs"/>
-              </a:rPr>
-              <a:t>() {</a:t>
-            </a:r>
-          </a:p>
-          <a:p>
-            <a:pPr lvl="3"/>
-            <a:r>
-              <a:rPr lang="en-US" sz="1200" kern="1200" dirty="0" smtClean="0">
-                <a:solidFill>
-                  <a:schemeClr val="tx1"/>
-                </a:solidFill>
-                <a:latin typeface="+mn-lt"/>
-                <a:ea typeface="+mn-ea"/>
-                <a:cs typeface="+mn-cs"/>
-              </a:rPr>
-              <a:t>            //Arrange</a:t>
-            </a:r>
-          </a:p>
-          <a:p>
-            <a:pPr lvl="3"/>
-            <a:r>
-              <a:rPr lang="en-US" sz="1200" kern="1200" dirty="0" smtClean="0">
-                <a:solidFill>
-                  <a:schemeClr val="tx1"/>
-                </a:solidFill>
-                <a:latin typeface="+mn-lt"/>
-                <a:ea typeface="+mn-ea"/>
-                <a:cs typeface="+mn-cs"/>
-              </a:rPr>
-              <a:t>            decimal val1 = 1.23m;</a:t>
-            </a:r>
-          </a:p>
-          <a:p>
-            <a:pPr lvl="3"/>
-            <a:r>
-              <a:rPr lang="en-US" sz="1200" kern="1200" dirty="0" smtClean="0">
-                <a:solidFill>
-                  <a:schemeClr val="tx1"/>
-                </a:solidFill>
-                <a:latin typeface="+mn-lt"/>
-                <a:ea typeface="+mn-ea"/>
-                <a:cs typeface="+mn-cs"/>
-              </a:rPr>
-              <a:t>            decimal val2 = 3.21m;</a:t>
-            </a:r>
-          </a:p>
-          <a:p>
-            <a:pPr lvl="3"/>
-            <a:r>
-              <a:rPr lang="en-US" sz="1200" kern="1200" dirty="0" smtClean="0">
-                <a:solidFill>
-                  <a:schemeClr val="tx1"/>
-                </a:solidFill>
-                <a:latin typeface="+mn-lt"/>
-                <a:ea typeface="+mn-ea"/>
-                <a:cs typeface="+mn-cs"/>
-              </a:rPr>
-              <a:t>            </a:t>
-            </a:r>
-            <a:r>
-              <a:rPr lang="en-US" sz="1200" kern="1200" dirty="0" err="1" smtClean="0">
-                <a:solidFill>
-                  <a:schemeClr val="tx1"/>
-                </a:solidFill>
-                <a:latin typeface="+mn-lt"/>
-                <a:ea typeface="+mn-ea"/>
-                <a:cs typeface="+mn-cs"/>
-              </a:rPr>
-              <a:t>ICalculatorService</a:t>
-            </a:r>
-            <a:r>
-              <a:rPr lang="en-US" sz="1200" kern="1200" dirty="0" smtClean="0">
-                <a:solidFill>
-                  <a:schemeClr val="tx1"/>
-                </a:solidFill>
-                <a:latin typeface="+mn-lt"/>
-                <a:ea typeface="+mn-ea"/>
-                <a:cs typeface="+mn-cs"/>
-              </a:rPr>
-              <a:t> service = new </a:t>
-            </a:r>
-            <a:r>
-              <a:rPr lang="en-US" sz="1200" kern="1200" dirty="0" err="1" smtClean="0">
-                <a:solidFill>
-                  <a:schemeClr val="tx1"/>
-                </a:solidFill>
-                <a:latin typeface="+mn-lt"/>
-                <a:ea typeface="+mn-ea"/>
-                <a:cs typeface="+mn-cs"/>
-              </a:rPr>
-              <a:t>CalculatorService</a:t>
-            </a:r>
-            <a:r>
-              <a:rPr lang="en-US" sz="1200" kern="1200" dirty="0" smtClean="0">
-                <a:solidFill>
-                  <a:schemeClr val="tx1"/>
-                </a:solidFill>
-                <a:latin typeface="+mn-lt"/>
-                <a:ea typeface="+mn-ea"/>
-                <a:cs typeface="+mn-cs"/>
-              </a:rPr>
-              <a:t>();</a:t>
-            </a:r>
-          </a:p>
-          <a:p>
-            <a:pPr lvl="3"/>
-            <a:r>
-              <a:rPr lang="en-US" sz="1200" kern="1200" dirty="0" smtClean="0">
-                <a:solidFill>
-                  <a:schemeClr val="tx1"/>
-                </a:solidFill>
-                <a:latin typeface="+mn-lt"/>
-                <a:ea typeface="+mn-ea"/>
-                <a:cs typeface="+mn-cs"/>
-              </a:rPr>
-              <a:t>            //Act</a:t>
-            </a:r>
-          </a:p>
-          <a:p>
-            <a:pPr lvl="3"/>
-            <a:r>
-              <a:rPr lang="en-US" sz="1200" kern="1200" dirty="0" smtClean="0">
-                <a:solidFill>
-                  <a:schemeClr val="tx1"/>
-                </a:solidFill>
-                <a:latin typeface="+mn-lt"/>
-                <a:ea typeface="+mn-ea"/>
-                <a:cs typeface="+mn-cs"/>
-              </a:rPr>
-              <a:t>            </a:t>
-            </a:r>
-            <a:r>
-              <a:rPr lang="en-US" sz="1200" kern="1200" dirty="0" err="1" smtClean="0">
-                <a:solidFill>
-                  <a:schemeClr val="tx1"/>
-                </a:solidFill>
-                <a:latin typeface="+mn-lt"/>
-                <a:ea typeface="+mn-ea"/>
-                <a:cs typeface="+mn-cs"/>
-              </a:rPr>
-              <a:t>var</a:t>
-            </a:r>
-            <a:r>
-              <a:rPr lang="en-US" sz="1200" kern="1200" dirty="0" smtClean="0">
-                <a:solidFill>
-                  <a:schemeClr val="tx1"/>
-                </a:solidFill>
-                <a:latin typeface="+mn-lt"/>
-                <a:ea typeface="+mn-ea"/>
-                <a:cs typeface="+mn-cs"/>
-              </a:rPr>
-              <a:t> result = </a:t>
-            </a:r>
-            <a:r>
-              <a:rPr lang="en-US" sz="1200" kern="1200" dirty="0" err="1" smtClean="0">
-                <a:solidFill>
-                  <a:schemeClr val="tx1"/>
-                </a:solidFill>
-                <a:latin typeface="+mn-lt"/>
-                <a:ea typeface="+mn-ea"/>
-                <a:cs typeface="+mn-cs"/>
-              </a:rPr>
-              <a:t>service.Add</a:t>
-            </a:r>
-            <a:r>
-              <a:rPr lang="en-US" sz="1200" kern="1200" dirty="0" smtClean="0">
-                <a:solidFill>
-                  <a:schemeClr val="tx1"/>
-                </a:solidFill>
-                <a:latin typeface="+mn-lt"/>
-                <a:ea typeface="+mn-ea"/>
-                <a:cs typeface="+mn-cs"/>
-              </a:rPr>
-              <a:t>(val1, val2);</a:t>
-            </a:r>
-          </a:p>
-          <a:p>
-            <a:pPr lvl="3"/>
-            <a:r>
-              <a:rPr lang="en-US" sz="1200" kern="1200" dirty="0" smtClean="0">
-                <a:solidFill>
-                  <a:schemeClr val="tx1"/>
-                </a:solidFill>
-                <a:latin typeface="+mn-lt"/>
-                <a:ea typeface="+mn-ea"/>
-                <a:cs typeface="+mn-cs"/>
-              </a:rPr>
-              <a:t>            //Assert</a:t>
-            </a:r>
-          </a:p>
-          <a:p>
-            <a:pPr lvl="3"/>
-            <a:r>
-              <a:rPr lang="en-US" sz="1200" kern="1200" dirty="0" smtClean="0">
-                <a:solidFill>
-                  <a:schemeClr val="tx1"/>
-                </a:solidFill>
-                <a:latin typeface="+mn-lt"/>
-                <a:ea typeface="+mn-ea"/>
-                <a:cs typeface="+mn-cs"/>
-              </a:rPr>
-              <a:t>            </a:t>
-            </a:r>
-            <a:r>
-              <a:rPr lang="en-US" sz="1200" kern="1200" dirty="0" err="1" smtClean="0">
-                <a:solidFill>
-                  <a:schemeClr val="tx1"/>
-                </a:solidFill>
-                <a:latin typeface="+mn-lt"/>
-                <a:ea typeface="+mn-ea"/>
-                <a:cs typeface="+mn-cs"/>
-              </a:rPr>
-              <a:t>Assert.IsInstanceOfType</a:t>
-            </a:r>
-            <a:r>
-              <a:rPr lang="en-US" sz="1200" kern="1200" dirty="0" smtClean="0">
-                <a:solidFill>
-                  <a:schemeClr val="tx1"/>
-                </a:solidFill>
-                <a:latin typeface="+mn-lt"/>
-                <a:ea typeface="+mn-ea"/>
-                <a:cs typeface="+mn-cs"/>
-              </a:rPr>
-              <a:t>(result, </a:t>
-            </a:r>
-            <a:r>
-              <a:rPr lang="en-US" sz="1200" kern="1200" dirty="0" err="1" smtClean="0">
-                <a:solidFill>
-                  <a:schemeClr val="tx1"/>
-                </a:solidFill>
-                <a:latin typeface="+mn-lt"/>
-                <a:ea typeface="+mn-ea"/>
-                <a:cs typeface="+mn-cs"/>
-              </a:rPr>
-              <a:t>typeof</a:t>
-            </a:r>
-            <a:r>
-              <a:rPr lang="en-US" sz="1200" kern="1200" dirty="0" smtClean="0">
-                <a:solidFill>
-                  <a:schemeClr val="tx1"/>
-                </a:solidFill>
-                <a:latin typeface="+mn-lt"/>
-                <a:ea typeface="+mn-ea"/>
-                <a:cs typeface="+mn-cs"/>
-              </a:rPr>
-              <a:t> (decimal));</a:t>
-            </a:r>
-          </a:p>
-          <a:p>
-            <a:pPr lvl="3"/>
-            <a:r>
-              <a:rPr lang="en-US" sz="1200" kern="1200" dirty="0" smtClean="0">
-                <a:solidFill>
-                  <a:schemeClr val="tx1"/>
-                </a:solidFill>
-                <a:latin typeface="+mn-lt"/>
-                <a:ea typeface="+mn-ea"/>
-                <a:cs typeface="+mn-cs"/>
-              </a:rPr>
-              <a:t>        }</a:t>
-            </a:r>
-          </a:p>
-          <a:p>
-            <a:pPr lvl="3"/>
-            <a:endParaRPr lang="en-US" sz="2400" dirty="0" smtClean="0"/>
-          </a:p>
-          <a:p>
-            <a:pPr marL="1200150" lvl="2" indent="-285750" algn="l">
-              <a:buFont typeface="Arial" pitchFamily="34" charset="0"/>
-              <a:buChar char="•"/>
-            </a:pPr>
-            <a:r>
-              <a:rPr lang="en-US" sz="1400" dirty="0" smtClean="0"/>
-              <a:t>Run it – it fails because we don’t have the</a:t>
-            </a:r>
-            <a:r>
-              <a:rPr lang="en-US" sz="1400" baseline="0" dirty="0" smtClean="0"/>
-              <a:t> method implemented…</a:t>
-            </a:r>
-            <a:r>
-              <a:rPr lang="en-US" sz="1400" b="1" baseline="0" dirty="0" smtClean="0"/>
-              <a:t>this is our RED</a:t>
-            </a:r>
-          </a:p>
-          <a:p>
-            <a:pPr marL="1200150" lvl="2" indent="-285750" algn="l">
-              <a:buFont typeface="Arial" pitchFamily="34" charset="0"/>
-              <a:buChar char="•"/>
-            </a:pPr>
-            <a:r>
-              <a:rPr lang="en-US" sz="1400" b="0" baseline="0" dirty="0" smtClean="0"/>
-              <a:t>Implement method…</a:t>
-            </a:r>
-            <a:r>
-              <a:rPr lang="en-US" sz="1400" b="1" baseline="0" dirty="0" smtClean="0"/>
-              <a:t>have it just return 0</a:t>
-            </a:r>
-            <a:r>
-              <a:rPr lang="en-US" sz="1400" b="0" baseline="0" dirty="0" smtClean="0"/>
-              <a:t>…that is all we need to get the test to pass.</a:t>
-            </a:r>
-          </a:p>
-          <a:p>
-            <a:pPr marL="1200150" lvl="2" indent="-285750" algn="l">
-              <a:buFont typeface="Arial" pitchFamily="34" charset="0"/>
-              <a:buChar char="•"/>
-            </a:pPr>
-            <a:r>
-              <a:rPr lang="en-US" sz="1400" b="0" baseline="0" dirty="0" smtClean="0"/>
-              <a:t>Run test…it’s </a:t>
-            </a:r>
-            <a:r>
-              <a:rPr lang="en-US" sz="1400" b="1" baseline="0" dirty="0" smtClean="0"/>
-              <a:t>Green…great…but…</a:t>
-            </a:r>
-            <a:endParaRPr lang="en-US" sz="1400" b="0" dirty="0" smtClean="0"/>
-          </a:p>
-          <a:p>
-            <a:pPr marL="1200150" lvl="2" indent="-285750" algn="l">
-              <a:buFont typeface="Arial" pitchFamily="34" charset="0"/>
-              <a:buChar char="•"/>
-            </a:pPr>
-            <a:r>
-              <a:rPr lang="en-US" sz="1400" dirty="0" smtClean="0"/>
-              <a:t>Talk about readability</a:t>
-            </a:r>
-          </a:p>
-          <a:p>
-            <a:pPr marL="1200150" lvl="2" indent="-285750" algn="l">
-              <a:buFont typeface="Arial" pitchFamily="34" charset="0"/>
-              <a:buChar char="•"/>
-            </a:pPr>
-            <a:r>
-              <a:rPr lang="en-US" sz="1400" dirty="0" smtClean="0"/>
-              <a:t>Talk about NuGet</a:t>
-            </a:r>
-          </a:p>
-          <a:p>
-            <a:pPr marL="1200150" lvl="2" indent="-285750" algn="l">
-              <a:buFont typeface="Arial" pitchFamily="34" charset="0"/>
-              <a:buChar char="•"/>
-            </a:pPr>
-            <a:r>
-              <a:rPr lang="en-US" sz="1400" dirty="0" smtClean="0"/>
-              <a:t>Install Should</a:t>
-            </a:r>
-          </a:p>
-          <a:p>
-            <a:pPr marL="2114550" lvl="4" indent="-285750" algn="l">
-              <a:buFont typeface="Arial" pitchFamily="34" charset="0"/>
-              <a:buChar char="•"/>
-            </a:pPr>
-            <a:r>
-              <a:rPr lang="en-US" sz="1400" dirty="0" smtClean="0"/>
-              <a:t>Add using</a:t>
-            </a:r>
-          </a:p>
-          <a:p>
-            <a:pPr marL="2114550" lvl="4" indent="-285750" algn="l">
-              <a:buFont typeface="Arial" pitchFamily="34" charset="0"/>
-              <a:buChar char="•"/>
-            </a:pPr>
-            <a:r>
-              <a:rPr lang="en-US" sz="1400" dirty="0" smtClean="0"/>
-              <a:t>Re-code test to use .</a:t>
-            </a:r>
-            <a:r>
-              <a:rPr lang="en-US" sz="1400" dirty="0" err="1" smtClean="0"/>
-              <a:t>ShouldBeType</a:t>
-            </a:r>
-            <a:endParaRPr lang="en-US" sz="1400" dirty="0" smtClean="0"/>
-          </a:p>
-          <a:p>
-            <a:pPr marL="1200150" lvl="2" indent="-285750" algn="l">
-              <a:buFont typeface="Arial" pitchFamily="34" charset="0"/>
-              <a:buChar char="•"/>
-            </a:pPr>
-            <a:r>
-              <a:rPr lang="en-US" sz="1400" dirty="0" smtClean="0"/>
-              <a:t>Write test to use Should...explain Should</a:t>
-            </a:r>
-          </a:p>
-          <a:p>
-            <a:pPr marL="1200150" lvl="2" indent="-285750" algn="l">
-              <a:buFont typeface="Arial" pitchFamily="34" charset="0"/>
-              <a:buChar char="•"/>
-            </a:pPr>
-            <a:r>
-              <a:rPr lang="en-US" sz="1400" dirty="0" smtClean="0"/>
-              <a:t>Refactor</a:t>
-            </a:r>
-          </a:p>
-          <a:p>
-            <a:pPr marL="1657350" lvl="3" indent="-285750" algn="l">
-              <a:buFont typeface="Arial" pitchFamily="34" charset="0"/>
-              <a:buChar char="•"/>
-            </a:pPr>
-            <a:r>
-              <a:rPr lang="en-US" sz="1400" dirty="0" smtClean="0"/>
-              <a:t>Declare decimal </a:t>
-            </a:r>
-            <a:r>
-              <a:rPr lang="en-US" sz="1400" dirty="0" err="1" smtClean="0"/>
-              <a:t>calculatedResult</a:t>
-            </a:r>
-            <a:r>
-              <a:rPr lang="en-US" sz="1400" dirty="0" smtClean="0"/>
-              <a:t> and return it</a:t>
-            </a:r>
           </a:p>
           <a:p>
             <a:pPr eaLnBrk="1" hangingPunct="1">
@@ -4074,9 +3735,10 @@
               <a:buChar char="•"/>
             </a:pPr>
             <a:r>
-              <a:rPr lang="en-US" dirty="0" smtClean="0"/>
-              <a:t>3 types</a:t>
-            </a:r>
+              <a:rPr lang="en-US" dirty="0" err="1" smtClean="0"/>
+              <a:t>Typs</a:t>
+            </a:r>
+            <a:endParaRPr lang="en-US" dirty="0" smtClean="0"/>
           </a:p>
           <a:p>
             <a:pPr marL="1200150" lvl="2" indent="-285750" algn="l">
@@ -4099,31 +3761,11 @@
             </a:r>
           </a:p>
           <a:p>
-            <a:pPr marL="1200150" lvl="2" indent="-285750" algn="l">
-              <a:buFont typeface="Arial" pitchFamily="34" charset="0"/>
-              <a:buChar char="•"/>
-            </a:pPr>
-            <a:r>
-              <a:rPr lang="en-US" dirty="0" smtClean="0"/>
-              <a:t>Interface (really used along with constructor and property, passing in interfaces)</a:t>
-            </a:r>
-          </a:p>
-          <a:p>
-            <a:pPr marL="1200150" lvl="2" indent="-285750" algn="l">
-              <a:buFont typeface="Arial" pitchFamily="34" charset="0"/>
-              <a:buChar char="•"/>
-            </a:pPr>
-            <a:endParaRPr lang="en-US" dirty="0" smtClean="0"/>
-          </a:p>
-          <a:p>
             <a:pPr marL="914400" lvl="2" indent="0" algn="l">
               <a:buFont typeface="Arial" pitchFamily="34" charset="0"/>
               <a:buNone/>
             </a:pPr>
-            <a:r>
-              <a:rPr lang="en-US" b="1" dirty="0" smtClean="0"/>
-              <a:t>CLICK</a:t>
-            </a:r>
+            <a:endParaRPr lang="en-US" dirty="0" smtClean="0"/>
           </a:p>
           <a:p>
             <a:pPr marL="914400" lvl="2" indent="0" algn="l">
@@ -4132,15 +3774,25 @@
             </a:pPr>
             <a:r>
               <a:rPr lang="en-US" b="1" dirty="0" smtClean="0"/>
-              <a:t>AND You can’t have DI</a:t>
+              <a:t>CLICK</a:t>
+            </a:r>
+          </a:p>
+          <a:p>
+            <a:pPr marL="914400" lvl="2" indent="0" algn="l">
+              <a:buFont typeface="Arial" pitchFamily="34" charset="0"/>
+              <a:buNone/>
+            </a:pPr>
+            <a:r>
+              <a:rPr lang="en-US" b="1" dirty="0" smtClean="0"/>
+              <a:t>AND </a:t>
+            </a:r>
+            <a:r>
+              <a:rPr lang="en-US" b="1" dirty="0" smtClean="0"/>
+              <a:t>Inversion</a:t>
             </a:r>
             <a:r>
               <a:rPr lang="en-US" b="1" baseline="0" dirty="0" smtClean="0"/>
-              <a:t> w/out </a:t>
-            </a:r>
-            <a:r>
-              <a:rPr lang="en-US" b="1" baseline="0" dirty="0" err="1" smtClean="0"/>
-              <a:t>IoC</a:t>
+              <a:t> of Control</a:t>
             </a:r>
             <a:endParaRPr lang="en-US" b="1" dirty="0" smtClean="0"/>
           </a:p>
@@ -4168,8 +3820,13 @@
             </a:pPr>
             <a:r>
               <a:rPr lang="en-US" dirty="0" smtClean="0"/>
-              <a:t>All it knows is the method signatures it needs</a:t>
-            </a:r>
+              <a:t>All it knows is the </a:t>
+            </a:r>
+            <a:r>
+              <a:rPr lang="en-US" dirty="0" smtClean="0"/>
+              <a:t>contract or interface</a:t>
+            </a:r>
+            <a:endParaRPr lang="en-US" dirty="0" smtClean="0"/>
           </a:p>
           <a:p>
             <a:pPr eaLnBrk="1" hangingPunct="1">
@@ -4295,8 +3952,43 @@
             </a:pPr>
             <a:r>
               <a:rPr lang="en-US" dirty="0" smtClean="0"/>
-              <a:t>Separation of Concerns</a:t>
-            </a:r>
+              <a:t>Separation of </a:t>
+            </a:r>
+            <a:r>
+              <a:rPr lang="en-US" dirty="0" smtClean="0"/>
+              <a:t>Concerns</a:t>
+            </a:r>
+          </a:p>
+          <a:p>
+            <a:pPr marL="1200150" lvl="2" indent="-285750" algn="l">
+              <a:buFont typeface="Arial" pitchFamily="34" charset="0"/>
+              <a:buChar char="•"/>
+            </a:pPr>
+            <a:r>
+              <a:rPr lang="en-US" dirty="0" smtClean="0"/>
+              <a:t>A piece of code</a:t>
+            </a:r>
+            <a:r>
+              <a:rPr lang="en-US" baseline="0" dirty="0" smtClean="0"/>
+              <a:t> should only be concerned about it’s core responsibilities.</a:t>
+            </a:r>
+          </a:p>
+          <a:p>
+            <a:pPr marL="1200150" lvl="2" indent="-285750" algn="l">
+              <a:buFont typeface="Arial" pitchFamily="34" charset="0"/>
+              <a:buChar char="•"/>
+            </a:pPr>
+            <a:r>
+              <a:rPr lang="en-US" baseline="0" dirty="0" smtClean="0"/>
+              <a:t>A business logic class shouldn’t care or know about how the logger is implemented</a:t>
+            </a:r>
+          </a:p>
+          <a:p>
+            <a:pPr marL="914400" lvl="2" indent="0" algn="l">
+              <a:buFont typeface="Arial" pitchFamily="34" charset="0"/>
+              <a:buNone/>
+            </a:pPr>
+            <a:endParaRPr lang="en-US" dirty="0" smtClean="0"/>
           </a:p>
           <a:p>
             <a:pPr marL="742950" lvl="1" indent="-285750" algn="l">
@@ -4306,6 +3998,21 @@
             <a:r>
               <a:rPr lang="en-US" dirty="0" err="1" smtClean="0"/>
               <a:t>Mockability</a:t>
+            </a:r>
+            <a:endParaRPr lang="en-US" dirty="0" smtClean="0"/>
+          </a:p>
+          <a:p>
+            <a:pPr marL="1200150" lvl="2" indent="-285750" algn="l">
+              <a:buFont typeface="Arial" pitchFamily="34" charset="0"/>
+              <a:buChar char="•"/>
+            </a:pPr>
+            <a:r>
+              <a:rPr lang="en-US" dirty="0" smtClean="0"/>
+              <a:t>We’ll</a:t>
+            </a:r>
+            <a:r>
+              <a:rPr lang="en-US" baseline="0" dirty="0" smtClean="0"/>
+              <a:t> talk about much more in a bit</a:t>
             </a:r>
             <a:endParaRPr lang="en-US" dirty="0" smtClean="0"/>
           </a:p>
@@ -20019,6 +19726,19 @@
 </file>
 
 <file path=customXml/item1.xml><?xml version="1.0" encoding="utf-8"?>
+<p:properties xmlns:p="http://schemas.microsoft.com/office/2006/metadata/properties" xmlns:xsi="http://www.w3.org/2001/XMLSchema-instance" xmlns:pc="http://schemas.microsoft.com/office/infopath/2007/PartnerControls">
+  <documentManagement>
+    <Description0 xmlns="1e37aee8-73ad-441e-bced-8b530ad9291b">PowerPoint template with Microsoft Partner Network logo on it.</Description0>
+    <_dlc_DocId xmlns="52ad97b0-86c1-49b5-b544-c488bf38e7c0">SAZVWXQSR7YH-3011-7</_dlc_DocId>
+    <_dlc_DocIdUrl xmlns="52ad97b0-86c1-49b5-b544-c488bf38e7c0">
+      <Url>https://my.skylinetechnologies.com/Support/SalesMarketingCenter/branding/_layouts/DocIdRedir.aspx?ID=SAZVWXQSR7YH-3011-7</Url>
+      <Description>SAZVWXQSR7YH-3011-7</Description>
+    </_dlc_DocIdUrl>
+  </documentManagement>
+</p:properties>
+</file>
+
+<file path=customXml/item2.xml><?xml version="1.0" encoding="utf-8"?>
 <ct:contentTypeSchema xmlns:ct="http://schemas.microsoft.com/office/2006/metadata/contentType" xmlns:ma="http://schemas.microsoft.com/office/2006/metadata/properties/metaAttributes" ct:_="" ma:_="" ma:contentTypeName="Document" ma:contentTypeID="0x0101004D2E750987EE2543B234B3A674D6BE3D" ma:contentTypeVersion="105" ma:contentTypeDescription="Create a new document." ma:contentTypeScope="" ma:versionID="62fa037737ae31885dcb260bd5c7d1f2">
   <xsd:schema xmlns:xsd="http://www.w3.org/2001/XMLSchema" xmlns:xs="http://www.w3.org/2001/XMLSchema" xmlns:p="http://schemas.microsoft.com/office/2006/metadata/properties" xmlns:ns2="1e37aee8-73ad-441e-bced-8b530ad9291b" xmlns:ns3="52ad97b0-86c1-49b5-b544-c488bf38e7c0" targetNamespace="http://schemas.microsoft.com/office/2006/metadata/properties" ma:root="true" ma:fieldsID="ce0d2501b4c25830d7e1734de94951c7" ns2:_="" ns3:_="">
     <xsd:import namespace="1e37aee8-73ad-441e-bced-8b530ad9291b"/>
@@ -20176,20 +19896,16 @@
 </ct:contentTypeSchema>
 </file>
 
-<file path=customXml/item2.xml><?xml version="1.0" encoding="utf-8"?>
-<p:properties xmlns:p="http://schemas.microsoft.com/office/2006/metadata/properties" xmlns:xsi="http://www.w3.org/2001/XMLSchema-instance" xmlns:pc="http://schemas.microsoft.com/office/infopath/2007/PartnerControls">
-  <documentManagement>
-    <Description0 xmlns="1e37aee8-73ad-441e-bced-8b530ad9291b">PowerPoint template with Microsoft Partner Network logo on it.</Description0>
-    <_dlc_DocId xmlns="52ad97b0-86c1-49b5-b544-c488bf38e7c0">SAZVWXQSR7YH-3011-7</_dlc_DocId>
-    <_dlc_DocIdUrl xmlns="52ad97b0-86c1-49b5-b544-c488bf38e7c0">
-      <Url>https://my.skylinetechnologies.com/Support/SalesMarketingCenter/branding/_layouts/DocIdRedir.aspx?ID=SAZVWXQSR7YH-3011-7</Url>
-      <Description>SAZVWXQSR7YH-3011-7</Description>
-    </_dlc_DocIdUrl>
-  </documentManagement>
-</p:properties>
+<file path=customXml/item3.xml><?xml version="1.0" encoding="utf-8"?>
+<?mso-contentType ?>
+<FormTemplates xmlns="http://schemas.microsoft.com/sharepoint/v3/contenttype/forms">
+  <Display>DocumentLibraryForm</Display>
+  <Edit>DocumentLibraryForm</Edit>
+  <New>DocumentLibraryForm</New>
+</FormTemplates>
 </file>
 
-<file path=customXml/item3.xml><?xml version="1.0" encoding="utf-8"?>
+<file path=customXml/item4.xml><?xml version="1.0" encoding="utf-8"?>
 <?mso-contentType ?>
 <spe:Receivers xmlns:spe="http://schemas.microsoft.com/sharepoint/events">
   <Receiver>
@@ -20235,16 +19951,24 @@
 </spe:Receivers>
 </file>
 
-<file path=customXml/item4.xml><?xml version="1.0" encoding="utf-8"?>
-<?mso-contentType ?>
-<FormTemplates xmlns="http://schemas.microsoft.com/sharepoint/v3/contenttype/forms">
-  <Display>DocumentLibraryForm</Display>
-  <Edit>DocumentLibraryForm</Edit>
-  <New>DocumentLibraryForm</New>
-</FormTemplates>
+<file path=customXml/itemProps1.xml><?xml version="1.0" encoding="utf-8"?>
+<ds:datastoreItem xmlns:ds="http://schemas.openxmlformats.org/officeDocument/2006/customXml" ds:itemID="{9F5040E5-4564-49C1-9147-56F1700A1C56}">
+  <ds:schemaRefs>
+    <ds:schemaRef ds:uri="http://purl.org/dc/terms/"/>
+    <ds:schemaRef ds:uri="52ad97b0-86c1-49b5-b544-c488bf38e7c0"/>
+    <ds:schemaRef ds:uri="http://schemas.openxmlformats.org/package/2006/metadata/core-properties"/>
+    <ds:schemaRef ds:uri="http://purl.org/dc/elements/1.1/"/>
+    <ds:schemaRef ds:uri="http://www.w3.org/XML/1998/namespace"/>
+    <ds:schemaRef ds:uri="http://schemas.microsoft.com/office/2006/documentManagement/types"/>
+    <ds:schemaRef ds:uri="1e37aee8-73ad-441e-bced-8b530ad9291b"/>
+    <ds:schemaRef ds:uri="http://schemas.microsoft.com/office/2006/metadata/properties"/>
+    <ds:schemaRef ds:uri="http://schemas.microsoft.com/office/infopath/2007/PartnerControls"/>
+    <ds:schemaRef ds:uri="http://purl.org/dc/dcmitype/"/>
+  </ds:schemaRefs>
+</ds:datastoreItem>
 </file>
 
-<file path=customXml/itemProps1.xml><?xml version="1.0" encoding="utf-8"?>
+<file path=customXml/itemProps2.xml><?xml version="1.0" encoding="utf-8"?>
 <ds:datastoreItem xmlns:ds="http://schemas.openxmlformats.org/officeDocument/2006/customXml" ds:itemID="{B03FC495-EB61-4A2C-B8E7-345CEB92DF9F}">
   <ds:schemaRefs>
     <ds:schemaRef ds:uri="http://schemas.microsoft.com/office/2006/metadata/contentType"/>
@@ -20263,35 +19987,18 @@
 </ds:datastoreItem>
 </file>
 
-<file path=customXml/itemProps2.xml><?xml version="1.0" encoding="utf-8"?>
-<ds:datastoreItem xmlns:ds="http://schemas.openxmlformats.org/officeDocument/2006/customXml" ds:itemID="{9F5040E5-4564-49C1-9147-56F1700A1C56}">
+<file path=customXml/itemProps3.xml><?xml version="1.0" encoding="utf-8"?>
+<ds:datastoreItem xmlns:ds="http://schemas.openxmlformats.org/officeDocument/2006/customXml" ds:itemID="{B6DBE1C9-0895-41F8-89A3-98DC40E912B0}">
   <ds:schemaRefs>
-    <ds:schemaRef ds:uri="http://purl.org/dc/terms/"/>
-    <ds:schemaRef ds:uri="52ad97b0-86c1-49b5-b544-c488bf38e7c0"/>
-    <ds:schemaRef ds:uri="http://schemas.openxmlformats.org/package/2006/metadata/core-properties"/>
-    <ds:schemaRef ds:uri="http://purl.org/dc/elements/1.1/"/>
-    <ds:schemaRef ds:uri="http://www.w3.org/XML/1998/namespace"/>
-    <ds:schemaRef ds:uri="http://schemas.microsoft.com/office/2006/documentManagement/types"/>
-    <ds:schemaRef ds:uri="1e37aee8-73ad-441e-bced-8b530ad9291b"/>
-    <ds:schemaRef ds:uri="http://schemas.microsoft.com/office/2006/metadata/properties"/>
-    <ds:schemaRef ds:uri="http://schemas.microsoft.com/office/infopath/2007/PartnerControls"/>
-    <ds:schemaRef ds:uri="http://purl.org/dc/dcmitype/"/>
+    <ds:schemaRef ds:uri="http://schemas.microsoft.com/sharepoint/v3/contenttype/forms"/>
   </ds:schemaRefs>
 </ds:datastoreItem>
 </file>
 
-<file path=customXml/itemProps3.xml><?xml version="1.0" encoding="utf-8"?>
+<file path=customXml/itemProps4.xml><?xml version="1.0" encoding="utf-8"?>
 <ds:datastoreItem xmlns:ds="http://schemas.openxmlformats.org/officeDocument/2006/customXml" ds:itemID="{0068A067-F354-4585-8169-FC99DA836E1C}">
   <ds:schemaRefs>
     <ds:schemaRef ds:uri="http://schemas.microsoft.com/sharepoint/events"/>
   </ds:schemaRefs>
 </ds:datastoreItem>
-</file>
-
-<file path=customXml/itemProps4.xml><?xml version="1.0" encoding="utf-8"?>
-<ds:datastoreItem xmlns:ds="http://schemas.openxmlformats.org/officeDocument/2006/customXml" ds:itemID="{B6DBE1C9-0895-41F8-89A3-98DC40E912B0}">
-  <ds:schemaRefs>
-    <ds:schemaRef ds:uri="http://schemas.microsoft.com/sharepoint/v3/contenttype/forms"/>
-  </ds:schemaRefs>
-</ds:datastoreItem>
 </file>
</xml_diff>

<commit_message>
Finished updating for dotnetConf
</commit_message>
<xml_diff>
--- a/TestDrivingDotNet.pptx
+++ b/TestDrivingDotNet.pptx
@@ -3370,7 +3370,7 @@
             <a:prstTxWarp prst="textNoShape">
               <a:avLst/>
             </a:prstTxWarp>
-            <a:normAutofit fontScale="77500" lnSpcReduction="20000"/>
+            <a:normAutofit lnSpcReduction="10000"/>
           </a:bodyPr>
           <a:lstStyle/>
           <a:p>
@@ -3390,11 +3390,7 @@
             </a:pPr>
             <a:r>
               <a:rPr lang="en-US" sz="1400" dirty="0" smtClean="0"/>
-              <a:t>Must accept to 2 decimals, and </a:t>
-            </a:r>
-            <a:r>
-              <a:rPr lang="en-US" sz="1400" dirty="0" smtClean="0"/>
-              <a:t>return</a:t>
+              <a:t>Must accept to 2 decimals, and return</a:t>
             </a:r>
             <a:r>
               <a:rPr lang="en-US" sz="1400" baseline="0" dirty="0" smtClean="0"/>
@@ -3409,11 +3405,7 @@
             </a:pPr>
             <a:r>
               <a:rPr lang="en-US" sz="1400" dirty="0" smtClean="0"/>
-              <a:t>Write </a:t>
-            </a:r>
-            <a:r>
-              <a:rPr lang="en-US" sz="1400" dirty="0" smtClean="0"/>
-              <a:t>a test to make sure return value is a decimal</a:t>
+              <a:t>Write a test to make sure return value is a decimal</a:t>
             </a:r>
           </a:p>
           <a:p>
@@ -3438,11 +3430,7 @@
             </a:pPr>
             <a:r>
               <a:rPr lang="en-US" sz="1400" dirty="0" smtClean="0"/>
-              <a:t>Run </a:t>
-            </a:r>
-            <a:r>
-              <a:rPr lang="en-US" sz="1400" dirty="0" smtClean="0"/>
-              <a:t>it – it fails because we don’t have the</a:t>
+              <a:t>Run it – it fails because we don’t have the</a:t>
             </a:r>
             <a:r>
               <a:rPr lang="en-US" sz="1400" baseline="0" dirty="0" smtClean="0"/>
@@ -3578,7 +3566,6 @@
               <a:rPr lang="en-US" sz="1400" dirty="0" smtClean="0"/>
               <a:t> </a:t>
             </a:r>
-            <a:endParaRPr lang="en-US" sz="1400" dirty="0" smtClean="0"/>
           </a:p>
           <a:p>
             <a:pPr marL="1200150" lvl="2" indent="-285750" algn="l">
@@ -3589,7 +3576,6 @@
               <a:rPr lang="en-US" sz="1400" b="1" dirty="0" smtClean="0"/>
               <a:t>Refactor</a:t>
             </a:r>
-            <a:endParaRPr lang="en-US" sz="1400" b="1" dirty="0" smtClean="0"/>
           </a:p>
           <a:p>
             <a:pPr marL="1657350" lvl="3" indent="-285750" algn="l">
@@ -3600,7 +3586,6 @@
               <a:rPr lang="en-US" sz="1400" dirty="0" smtClean="0"/>
               <a:t>Nothing really to refactor</a:t>
             </a:r>
-            <a:endParaRPr lang="en-US" sz="1400" dirty="0" smtClean="0"/>
           </a:p>
           <a:p>
             <a:pPr eaLnBrk="1" hangingPunct="1">
@@ -3784,11 +3769,7 @@
             </a:pPr>
             <a:r>
               <a:rPr lang="en-US" b="1" dirty="0" smtClean="0"/>
-              <a:t>AND </a:t>
-            </a:r>
-            <a:r>
-              <a:rPr lang="en-US" b="1" dirty="0" smtClean="0"/>
-              <a:t>Inversion</a:t>
+              <a:t>AND Inversion</a:t>
             </a:r>
             <a:r>
               <a:rPr lang="en-US" b="1" baseline="0" dirty="0" smtClean="0"/>
@@ -3820,13 +3801,8 @@
             </a:pPr>
             <a:r>
               <a:rPr lang="en-US" dirty="0" smtClean="0"/>
-              <a:t>All it knows is the </a:t>
-            </a:r>
-            <a:r>
-              <a:rPr lang="en-US" dirty="0" smtClean="0"/>
-              <a:t>contract or interface</a:t>
-            </a:r>
-            <a:endParaRPr lang="en-US" dirty="0" smtClean="0"/>
+              <a:t>All it knows is the contract or interface</a:t>
+            </a:r>
           </a:p>
           <a:p>
             <a:pPr eaLnBrk="1" hangingPunct="1">
@@ -3952,11 +3928,7 @@
             </a:pPr>
             <a:r>
               <a:rPr lang="en-US" dirty="0" smtClean="0"/>
-              <a:t>Separation of </a:t>
-            </a:r>
-            <a:r>
-              <a:rPr lang="en-US" dirty="0" smtClean="0"/>
-              <a:t>Concerns</a:t>
+              <a:t>Separation of Concerns</a:t>
             </a:r>
           </a:p>
           <a:p>
@@ -4192,8 +4164,276 @@
             </a:pPr>
             <a:r>
               <a:rPr lang="en-US" dirty="0" smtClean="0"/>
-              <a:t>Start with Property Injection</a:t>
-            </a:r>
+              <a:t>Start with Property </a:t>
+            </a:r>
+            <a:r>
+              <a:rPr lang="en-US" dirty="0" smtClean="0"/>
+              <a:t>Injection</a:t>
+            </a:r>
+          </a:p>
+          <a:p>
+            <a:pPr marL="1200150" lvl="2" indent="-285750" algn="l">
+              <a:buFont typeface="Arial" pitchFamily="34" charset="0"/>
+              <a:buChar char="•"/>
+            </a:pPr>
+            <a:r>
+              <a:rPr lang="en-US" sz="1200" kern="1200" dirty="0" smtClean="0">
+                <a:solidFill>
+                  <a:schemeClr val="tx1"/>
+                </a:solidFill>
+                <a:effectLst/>
+                <a:latin typeface="Consolas" panose="020B0609020204030204" pitchFamily="49" charset="0"/>
+                <a:ea typeface="+mn-ea"/>
+                <a:cs typeface="Consolas" panose="020B0609020204030204" pitchFamily="49" charset="0"/>
+              </a:rPr>
+              <a:t>public</a:t>
+            </a:r>
+            <a:r>
+              <a:rPr lang="en-US" dirty="0" smtClean="0">
+                <a:latin typeface="Consolas" panose="020B0609020204030204" pitchFamily="49" charset="0"/>
+                <a:cs typeface="Consolas" panose="020B0609020204030204" pitchFamily="49" charset="0"/>
+              </a:rPr>
+              <a:t> </a:t>
+            </a:r>
+            <a:r>
+              <a:rPr lang="en-US" sz="1200" kern="1200" dirty="0" err="1" smtClean="0">
+                <a:solidFill>
+                  <a:schemeClr val="tx1"/>
+                </a:solidFill>
+                <a:effectLst/>
+                <a:latin typeface="Consolas" panose="020B0609020204030204" pitchFamily="49" charset="0"/>
+                <a:ea typeface="+mn-ea"/>
+                <a:cs typeface="Consolas" panose="020B0609020204030204" pitchFamily="49" charset="0"/>
+              </a:rPr>
+              <a:t>IValidationService</a:t>
+            </a:r>
+            <a:r>
+              <a:rPr lang="en-US" dirty="0" smtClean="0">
+                <a:latin typeface="Consolas" panose="020B0609020204030204" pitchFamily="49" charset="0"/>
+                <a:cs typeface="Consolas" panose="020B0609020204030204" pitchFamily="49" charset="0"/>
+              </a:rPr>
+              <a:t> </a:t>
+            </a:r>
+            <a:r>
+              <a:rPr lang="en-US" sz="1200" kern="1200" dirty="0" err="1" smtClean="0">
+                <a:solidFill>
+                  <a:schemeClr val="tx1"/>
+                </a:solidFill>
+                <a:effectLst/>
+                <a:latin typeface="Consolas" panose="020B0609020204030204" pitchFamily="49" charset="0"/>
+                <a:ea typeface="+mn-ea"/>
+                <a:cs typeface="Consolas" panose="020B0609020204030204" pitchFamily="49" charset="0"/>
+              </a:rPr>
+              <a:t>ValidationService</a:t>
+            </a:r>
+            <a:r>
+              <a:rPr lang="en-US" dirty="0" smtClean="0">
+                <a:latin typeface="Consolas" panose="020B0609020204030204" pitchFamily="49" charset="0"/>
+                <a:cs typeface="Consolas" panose="020B0609020204030204" pitchFamily="49" charset="0"/>
+              </a:rPr>
+              <a:t> { </a:t>
+            </a:r>
+            <a:r>
+              <a:rPr lang="en-US" sz="1200" kern="1200" dirty="0" smtClean="0">
+                <a:solidFill>
+                  <a:schemeClr val="tx1"/>
+                </a:solidFill>
+                <a:effectLst/>
+                <a:latin typeface="Consolas" panose="020B0609020204030204" pitchFamily="49" charset="0"/>
+                <a:ea typeface="+mn-ea"/>
+                <a:cs typeface="Consolas" panose="020B0609020204030204" pitchFamily="49" charset="0"/>
+              </a:rPr>
+              <a:t>get</a:t>
+            </a:r>
+            <a:r>
+              <a:rPr lang="en-US" dirty="0" smtClean="0">
+                <a:latin typeface="Consolas" panose="020B0609020204030204" pitchFamily="49" charset="0"/>
+                <a:cs typeface="Consolas" panose="020B0609020204030204" pitchFamily="49" charset="0"/>
+              </a:rPr>
+              <a:t>; </a:t>
+            </a:r>
+            <a:r>
+              <a:rPr lang="en-US" sz="1200" kern="1200" dirty="0" smtClean="0">
+                <a:solidFill>
+                  <a:schemeClr val="tx1"/>
+                </a:solidFill>
+                <a:effectLst/>
+                <a:latin typeface="Consolas" panose="020B0609020204030204" pitchFamily="49" charset="0"/>
+                <a:ea typeface="+mn-ea"/>
+                <a:cs typeface="Consolas" panose="020B0609020204030204" pitchFamily="49" charset="0"/>
+              </a:rPr>
+              <a:t>set</a:t>
+            </a:r>
+            <a:r>
+              <a:rPr lang="en-US" dirty="0" smtClean="0">
+                <a:latin typeface="Consolas" panose="020B0609020204030204" pitchFamily="49" charset="0"/>
+                <a:cs typeface="Consolas" panose="020B0609020204030204" pitchFamily="49" charset="0"/>
+              </a:rPr>
+              <a:t>; } </a:t>
+            </a:r>
+          </a:p>
+          <a:p>
+            <a:pPr marL="1200150" lvl="2" indent="-285750" algn="l">
+              <a:buFont typeface="Arial" pitchFamily="34" charset="0"/>
+              <a:buChar char="•"/>
+            </a:pPr>
+            <a:r>
+              <a:rPr lang="en-US" sz="1200" kern="1200" dirty="0" smtClean="0">
+                <a:solidFill>
+                  <a:schemeClr val="tx1"/>
+                </a:solidFill>
+                <a:effectLst/>
+                <a:latin typeface="Consolas" panose="020B0609020204030204" pitchFamily="49" charset="0"/>
+                <a:ea typeface="+mn-ea"/>
+                <a:cs typeface="Consolas" panose="020B0609020204030204" pitchFamily="49" charset="0"/>
+              </a:rPr>
+              <a:t>if</a:t>
+            </a:r>
+            <a:r>
+              <a:rPr lang="en-US" dirty="0" smtClean="0">
+                <a:latin typeface="Consolas" panose="020B0609020204030204" pitchFamily="49" charset="0"/>
+                <a:cs typeface="Consolas" panose="020B0609020204030204" pitchFamily="49" charset="0"/>
+              </a:rPr>
+              <a:t> (</a:t>
+            </a:r>
+            <a:r>
+              <a:rPr lang="en-US" sz="1200" kern="1200" dirty="0" err="1" smtClean="0">
+                <a:solidFill>
+                  <a:schemeClr val="tx1"/>
+                </a:solidFill>
+                <a:effectLst/>
+                <a:latin typeface="Consolas" panose="020B0609020204030204" pitchFamily="49" charset="0"/>
+                <a:ea typeface="+mn-ea"/>
+                <a:cs typeface="Consolas" panose="020B0609020204030204" pitchFamily="49" charset="0"/>
+              </a:rPr>
+              <a:t>ValidationService.ValidateForAdd</a:t>
+            </a:r>
+            <a:r>
+              <a:rPr lang="en-US" dirty="0" smtClean="0">
+                <a:latin typeface="Consolas" panose="020B0609020204030204" pitchFamily="49" charset="0"/>
+                <a:cs typeface="Consolas" panose="020B0609020204030204" pitchFamily="49" charset="0"/>
+              </a:rPr>
+              <a:t>(</a:t>
+            </a:r>
+            <a:r>
+              <a:rPr lang="en-US" sz="1200" kern="1200" dirty="0" smtClean="0">
+                <a:solidFill>
+                  <a:schemeClr val="tx1"/>
+                </a:solidFill>
+                <a:effectLst/>
+                <a:latin typeface="Consolas" panose="020B0609020204030204" pitchFamily="49" charset="0"/>
+                <a:ea typeface="+mn-ea"/>
+                <a:cs typeface="Consolas" panose="020B0609020204030204" pitchFamily="49" charset="0"/>
+              </a:rPr>
+              <a:t>value1</a:t>
+            </a:r>
+            <a:r>
+              <a:rPr lang="en-US" dirty="0" smtClean="0">
+                <a:latin typeface="Consolas" panose="020B0609020204030204" pitchFamily="49" charset="0"/>
+                <a:cs typeface="Consolas" panose="020B0609020204030204" pitchFamily="49" charset="0"/>
+              </a:rPr>
+              <a:t>, </a:t>
+            </a:r>
+            <a:r>
+              <a:rPr lang="en-US" sz="1200" kern="1200" dirty="0" smtClean="0">
+                <a:solidFill>
+                  <a:schemeClr val="tx1"/>
+                </a:solidFill>
+                <a:effectLst/>
+                <a:latin typeface="Consolas" panose="020B0609020204030204" pitchFamily="49" charset="0"/>
+                <a:ea typeface="+mn-ea"/>
+                <a:cs typeface="Consolas" panose="020B0609020204030204" pitchFamily="49" charset="0"/>
+              </a:rPr>
+              <a:t>value2</a:t>
+            </a:r>
+            <a:r>
+              <a:rPr lang="en-US" dirty="0" smtClean="0">
+                <a:latin typeface="Consolas" panose="020B0609020204030204" pitchFamily="49" charset="0"/>
+                <a:cs typeface="Consolas" panose="020B0609020204030204" pitchFamily="49" charset="0"/>
+              </a:rPr>
+              <a:t>)) </a:t>
+            </a:r>
+            <a:r>
+              <a:rPr lang="en-US" sz="1200" kern="1200" dirty="0" smtClean="0">
+                <a:solidFill>
+                  <a:schemeClr val="tx1"/>
+                </a:solidFill>
+                <a:effectLst/>
+                <a:latin typeface="Consolas" panose="020B0609020204030204" pitchFamily="49" charset="0"/>
+                <a:ea typeface="+mn-ea"/>
+                <a:cs typeface="Consolas" panose="020B0609020204030204" pitchFamily="49" charset="0"/>
+              </a:rPr>
+              <a:t>throw</a:t>
+            </a:r>
+            <a:r>
+              <a:rPr lang="en-US" dirty="0" smtClean="0">
+                <a:latin typeface="Consolas" panose="020B0609020204030204" pitchFamily="49" charset="0"/>
+                <a:cs typeface="Consolas" panose="020B0609020204030204" pitchFamily="49" charset="0"/>
+              </a:rPr>
+              <a:t> </a:t>
+            </a:r>
+            <a:r>
+              <a:rPr lang="en-US" sz="1200" kern="1200" dirty="0" smtClean="0">
+                <a:solidFill>
+                  <a:schemeClr val="tx1"/>
+                </a:solidFill>
+                <a:effectLst/>
+                <a:latin typeface="Consolas" panose="020B0609020204030204" pitchFamily="49" charset="0"/>
+                <a:ea typeface="+mn-ea"/>
+                <a:cs typeface="Consolas" panose="020B0609020204030204" pitchFamily="49" charset="0"/>
+              </a:rPr>
+              <a:t>new</a:t>
+            </a:r>
+            <a:r>
+              <a:rPr lang="en-US" dirty="0" smtClean="0">
+                <a:latin typeface="Consolas" panose="020B0609020204030204" pitchFamily="49" charset="0"/>
+                <a:cs typeface="Consolas" panose="020B0609020204030204" pitchFamily="49" charset="0"/>
+              </a:rPr>
+              <a:t> </a:t>
+            </a:r>
+            <a:r>
+              <a:rPr lang="en-US" sz="1200" kern="1200" dirty="0" smtClean="0">
+                <a:solidFill>
+                  <a:schemeClr val="tx1"/>
+                </a:solidFill>
+                <a:effectLst/>
+                <a:latin typeface="Consolas" panose="020B0609020204030204" pitchFamily="49" charset="0"/>
+                <a:ea typeface="+mn-ea"/>
+                <a:cs typeface="Consolas" panose="020B0609020204030204" pitchFamily="49" charset="0"/>
+              </a:rPr>
+              <a:t>Exception</a:t>
+            </a:r>
+            <a:r>
+              <a:rPr lang="en-US" dirty="0" smtClean="0">
+                <a:latin typeface="Consolas" panose="020B0609020204030204" pitchFamily="49" charset="0"/>
+                <a:cs typeface="Consolas" panose="020B0609020204030204" pitchFamily="49" charset="0"/>
+              </a:rPr>
+              <a:t>(</a:t>
+            </a:r>
+            <a:r>
+              <a:rPr lang="en-US" sz="1200" kern="1200" dirty="0" smtClean="0">
+                <a:solidFill>
+                  <a:schemeClr val="tx1"/>
+                </a:solidFill>
+                <a:effectLst/>
+                <a:latin typeface="Consolas" panose="020B0609020204030204" pitchFamily="49" charset="0"/>
+                <a:ea typeface="+mn-ea"/>
+                <a:cs typeface="Consolas" panose="020B0609020204030204" pitchFamily="49" charset="0"/>
+              </a:rPr>
+              <a:t>"DOH!"</a:t>
+            </a:r>
+            <a:r>
+              <a:rPr lang="en-US" dirty="0" smtClean="0">
+                <a:latin typeface="Consolas" panose="020B0609020204030204" pitchFamily="49" charset="0"/>
+                <a:cs typeface="Consolas" panose="020B0609020204030204" pitchFamily="49" charset="0"/>
+              </a:rPr>
+              <a:t>);</a:t>
+            </a:r>
+            <a:r>
+              <a:rPr lang="en-US" dirty="0" smtClean="0"/>
+              <a:t> </a:t>
+            </a:r>
+            <a:endParaRPr lang="en-US" dirty="0" smtClean="0"/>
           </a:p>
           <a:p>
             <a:pPr marL="1200150" lvl="2" indent="-285750" algn="l">
@@ -5712,16 +5952,9 @@
             </a:r>
           </a:p>
           <a:p>
-            <a:pPr marL="742950" lvl="1" indent="-285750" algn="l">
+            <a:pPr marL="457200" lvl="1" indent="0" algn="l">
               <a:buFont typeface="Arial" pitchFamily="34" charset="0"/>
-              <a:buChar char="•"/>
-            </a:pPr>
-            <a:endParaRPr lang="en-US" sz="1400" dirty="0" smtClean="0"/>
-          </a:p>
-          <a:p>
-            <a:pPr marL="742950" lvl="1" indent="-285750" algn="l">
-              <a:buFont typeface="Arial" pitchFamily="34" charset="0"/>
-              <a:buChar char="•"/>
+              <a:buNone/>
             </a:pPr>
             <a:endParaRPr lang="en-US" sz="1400" dirty="0" smtClean="0"/>
           </a:p>
@@ -6172,7 +6405,7 @@
             <a:prstTxWarp prst="textNoShape">
               <a:avLst/>
             </a:prstTxWarp>
-            <a:normAutofit lnSpcReduction="10000"/>
+            <a:normAutofit/>
           </a:bodyPr>
           <a:lstStyle/>
           <a:p>
@@ -6182,8 +6415,84 @@
             </a:pPr>
             <a:r>
               <a:rPr lang="en-US" sz="1400" dirty="0" smtClean="0"/>
-              <a:t>Install StructureMap with NuGet to Unit Testing project</a:t>
-            </a:r>
+              <a:t>Show </a:t>
+            </a:r>
+            <a:r>
+              <a:rPr lang="en-US" sz="1400" dirty="0" err="1" smtClean="0"/>
+              <a:t>IoCBootstrapper</a:t>
+            </a:r>
+            <a:endParaRPr lang="en-US" sz="1400" dirty="0" smtClean="0"/>
+          </a:p>
+          <a:p>
+            <a:pPr marL="1200150" lvl="2" indent="-285750" algn="l">
+              <a:buFont typeface="Arial" pitchFamily="34" charset="0"/>
+              <a:buChar char="•"/>
+            </a:pPr>
+            <a:r>
+              <a:rPr lang="en-US" sz="1400" dirty="0" smtClean="0"/>
+              <a:t>Talk about what it does…</a:t>
+            </a:r>
+          </a:p>
+          <a:p>
+            <a:pPr marL="1200150" lvl="2" indent="-285750" algn="l">
+              <a:buFont typeface="Arial" pitchFamily="34" charset="0"/>
+              <a:buChar char="•"/>
+            </a:pPr>
+            <a:r>
+              <a:rPr lang="en-US" sz="1400" dirty="0" smtClean="0"/>
+              <a:t>Scans all assemblies from</a:t>
+            </a:r>
+            <a:r>
+              <a:rPr lang="en-US" sz="1400" baseline="0" dirty="0" smtClean="0"/>
+              <a:t> the application’s base directory</a:t>
+            </a:r>
+          </a:p>
+          <a:p>
+            <a:pPr marL="1200150" lvl="2" indent="-285750" algn="l">
+              <a:buFont typeface="Arial" pitchFamily="34" charset="0"/>
+              <a:buChar char="•"/>
+            </a:pPr>
+            <a:r>
+              <a:rPr lang="en-US" sz="1400" baseline="0" dirty="0" smtClean="0"/>
+              <a:t>And uses convention to resolve </a:t>
+            </a:r>
+            <a:r>
+              <a:rPr lang="en-US" sz="1400" baseline="0" dirty="0" err="1" smtClean="0"/>
+              <a:t>IFoo</a:t>
+            </a:r>
+            <a:r>
+              <a:rPr lang="en-US" sz="1400" baseline="0" dirty="0" smtClean="0"/>
+              <a:t> to Foo.</a:t>
+            </a:r>
+          </a:p>
+          <a:p>
+            <a:pPr marL="1200150" lvl="2" indent="-285750" algn="l">
+              <a:buFont typeface="Arial" pitchFamily="34" charset="0"/>
+              <a:buChar char="•"/>
+            </a:pPr>
+            <a:r>
+              <a:rPr lang="en-US" sz="1400" baseline="0" dirty="0" smtClean="0"/>
+              <a:t>In this case we call the </a:t>
+            </a:r>
+            <a:r>
+              <a:rPr lang="en-US" sz="1400" baseline="0" dirty="0" err="1" smtClean="0"/>
+              <a:t>Boostrap</a:t>
+            </a:r>
+            <a:r>
+              <a:rPr lang="en-US" sz="1400" baseline="0" dirty="0" smtClean="0"/>
+              <a:t> method from our programs Main method because we are using a console app</a:t>
+            </a:r>
+          </a:p>
+          <a:p>
+            <a:pPr marL="1657350" lvl="3" indent="-285750" algn="l">
+              <a:buFont typeface="Arial" pitchFamily="34" charset="0"/>
+              <a:buChar char="•"/>
+            </a:pPr>
+            <a:r>
+              <a:rPr lang="en-US" sz="1400" baseline="0" dirty="0" smtClean="0"/>
+              <a:t>In a web app you would do the bootstrapping on Application Start</a:t>
+            </a:r>
+            <a:endParaRPr lang="en-US" sz="1400" dirty="0" smtClean="0"/>
           </a:p>
           <a:p>
             <a:pPr marL="742950" lvl="1" indent="-285750" algn="l">
@@ -6191,17 +6500,238 @@
               <a:buChar char="•"/>
             </a:pPr>
             <a:r>
-              <a:rPr lang="en-US" sz="1400" dirty="0" smtClean="0"/>
-              <a:t>Show </a:t>
-            </a:r>
-            <a:r>
-              <a:rPr lang="en-US" sz="1400" dirty="0" err="1" smtClean="0"/>
-              <a:t>DependencyResolver</a:t>
-            </a:r>
-            <a:r>
-              <a:rPr lang="en-US" sz="1400" dirty="0" smtClean="0"/>
-              <a:t> and talk about what it is doing</a:t>
-            </a:r>
+              <a:rPr lang="en-US" sz="1400" b="0" dirty="0" smtClean="0"/>
+              <a:t>Back</a:t>
+            </a:r>
+            <a:r>
+              <a:rPr lang="en-US" sz="1400" b="0" baseline="0" dirty="0" smtClean="0"/>
+              <a:t> in unit test</a:t>
+            </a:r>
+          </a:p>
+          <a:p>
+            <a:pPr marL="1200150" lvl="2" indent="-285750" algn="l">
+              <a:buFont typeface="Arial" pitchFamily="34" charset="0"/>
+              <a:buChar char="•"/>
+            </a:pPr>
+            <a:r>
+              <a:rPr lang="en-US" sz="1400" b="0" baseline="0" dirty="0" smtClean="0"/>
+              <a:t>Change instantiate of </a:t>
+            </a:r>
+            <a:r>
+              <a:rPr lang="en-US" sz="1400" b="0" baseline="0" dirty="0" err="1" smtClean="0"/>
+              <a:t>classUnderTest</a:t>
+            </a:r>
+            <a:r>
+              <a:rPr lang="en-US" sz="1400" b="0" baseline="0" dirty="0" smtClean="0"/>
+              <a:t> to </a:t>
+            </a:r>
+            <a:r>
+              <a:rPr lang="en-US" sz="1400" b="1" baseline="0" dirty="0" err="1" smtClean="0"/>
+              <a:t>ObjectFactory.GetInstance</a:t>
+            </a:r>
+            <a:r>
+              <a:rPr lang="en-US" sz="1400" b="1" baseline="0" dirty="0" smtClean="0"/>
+              <a:t>&lt;</a:t>
+            </a:r>
+            <a:r>
+              <a:rPr lang="en-US" sz="1400" b="1" baseline="0" dirty="0" err="1" smtClean="0"/>
+              <a:t>ICalculatorService</a:t>
+            </a:r>
+            <a:r>
+              <a:rPr lang="en-US" sz="1400" b="1" baseline="0" dirty="0" smtClean="0"/>
+              <a:t>&gt;();</a:t>
+            </a:r>
+          </a:p>
+          <a:p>
+            <a:pPr marL="1200150" lvl="2" indent="-285750" algn="l">
+              <a:buFont typeface="Arial" pitchFamily="34" charset="0"/>
+              <a:buChar char="•"/>
+            </a:pPr>
+            <a:r>
+              <a:rPr lang="en-US" sz="1200" b="0" kern="1200" dirty="0" smtClean="0">
+                <a:solidFill>
+                  <a:schemeClr val="tx1"/>
+                </a:solidFill>
+                <a:effectLst/>
+                <a:latin typeface="+mn-lt"/>
+                <a:ea typeface="+mn-ea"/>
+                <a:cs typeface="+mn-cs"/>
+              </a:rPr>
+              <a:t>Run</a:t>
+            </a:r>
+            <a:r>
+              <a:rPr lang="en-US" sz="1200" b="0" kern="1200" baseline="0" dirty="0" smtClean="0">
+                <a:solidFill>
+                  <a:schemeClr val="tx1"/>
+                </a:solidFill>
+                <a:effectLst/>
+                <a:latin typeface="+mn-lt"/>
+                <a:ea typeface="+mn-ea"/>
+                <a:cs typeface="+mn-cs"/>
+              </a:rPr>
+              <a:t> test and note that this fails with a plug in error telling us </a:t>
+            </a:r>
+            <a:r>
+              <a:rPr lang="en-US" sz="1200" b="0" kern="1200" baseline="0" dirty="0" err="1" smtClean="0">
+                <a:solidFill>
+                  <a:schemeClr val="tx1"/>
+                </a:solidFill>
+                <a:effectLst/>
+                <a:latin typeface="+mn-lt"/>
+                <a:ea typeface="+mn-ea"/>
+                <a:cs typeface="+mn-cs"/>
+              </a:rPr>
+              <a:t>structuremap</a:t>
+            </a:r>
+            <a:r>
+              <a:rPr lang="en-US" sz="1200" b="0" kern="1200" baseline="0" dirty="0" smtClean="0">
+                <a:solidFill>
+                  <a:schemeClr val="tx1"/>
+                </a:solidFill>
+                <a:effectLst/>
+                <a:latin typeface="+mn-lt"/>
+                <a:ea typeface="+mn-ea"/>
+                <a:cs typeface="+mn-cs"/>
+              </a:rPr>
+              <a:t> is not configured.</a:t>
+            </a:r>
+          </a:p>
+          <a:p>
+            <a:pPr marL="1200150" lvl="2" indent="-285750" algn="l">
+              <a:buFont typeface="Arial" pitchFamily="34" charset="0"/>
+              <a:buChar char="•"/>
+            </a:pPr>
+            <a:r>
+              <a:rPr lang="en-US" sz="1200" b="0" kern="1200" baseline="0" dirty="0" smtClean="0">
+                <a:solidFill>
+                  <a:schemeClr val="tx1"/>
+                </a:solidFill>
+                <a:effectLst/>
+                <a:latin typeface="+mn-lt"/>
+                <a:ea typeface="+mn-ea"/>
+                <a:cs typeface="+mn-cs"/>
+              </a:rPr>
+              <a:t>This makes sense because our Bootstrap method is not getting called</a:t>
+            </a:r>
+          </a:p>
+          <a:p>
+            <a:pPr marL="1200150" lvl="2" indent="-285750" algn="l">
+              <a:buFont typeface="Arial" pitchFamily="34" charset="0"/>
+              <a:buChar char="•"/>
+            </a:pPr>
+            <a:r>
+              <a:rPr lang="en-US" sz="1200" b="0" kern="1200" baseline="0" dirty="0" smtClean="0">
+                <a:solidFill>
+                  <a:schemeClr val="tx1"/>
+                </a:solidFill>
+                <a:effectLst/>
+                <a:latin typeface="+mn-lt"/>
+                <a:ea typeface="+mn-ea"/>
+                <a:cs typeface="+mn-cs"/>
+              </a:rPr>
+              <a:t>I don’t want to call the Bootstrap method from my test because I want the flexibility to use other implementations of the interfaces like mocks</a:t>
+            </a:r>
+          </a:p>
+          <a:p>
+            <a:pPr marL="1200150" lvl="2" indent="-285750" algn="l">
+              <a:buFont typeface="Arial" pitchFamily="34" charset="0"/>
+              <a:buChar char="•"/>
+            </a:pPr>
+            <a:r>
+              <a:rPr lang="en-US" sz="1400" b="0" dirty="0" smtClean="0"/>
+              <a:t>Directly</a:t>
+            </a:r>
+            <a:r>
+              <a:rPr lang="en-US" sz="1400" b="0" baseline="0" dirty="0" smtClean="0"/>
+              <a:t> before </a:t>
+            </a:r>
+            <a:r>
+              <a:rPr lang="en-US" sz="1400" b="0" baseline="0" dirty="0" err="1" smtClean="0"/>
+              <a:t>mockRepository.VerifyAll</a:t>
+            </a:r>
+            <a:r>
+              <a:rPr lang="en-US" sz="1400" b="0" baseline="0" dirty="0" smtClean="0"/>
+              <a:t> … </a:t>
+            </a:r>
+            <a:r>
+              <a:rPr lang="en-US" sz="1400" b="1" baseline="0" dirty="0" smtClean="0"/>
+              <a:t>tdd2</a:t>
+            </a:r>
+          </a:p>
+          <a:p>
+            <a:pPr marL="1657350" lvl="3" indent="-285750" algn="l">
+              <a:buFont typeface="Arial" pitchFamily="34" charset="0"/>
+              <a:buChar char="•"/>
+            </a:pPr>
+            <a:r>
+              <a:rPr lang="en-US" sz="1400" b="0" dirty="0" smtClean="0"/>
+              <a:t>So what we</a:t>
+            </a:r>
+            <a:r>
+              <a:rPr lang="en-US" sz="1400" b="0" baseline="0" dirty="0" smtClean="0"/>
+              <a:t> are doing here is configuring </a:t>
+            </a:r>
+            <a:r>
+              <a:rPr lang="en-US" sz="1400" b="0" baseline="0" dirty="0" err="1" smtClean="0"/>
+              <a:t>Structuremap</a:t>
+            </a:r>
+            <a:r>
+              <a:rPr lang="en-US" sz="1400" b="0" baseline="0" dirty="0" smtClean="0"/>
+              <a:t> for the dependencies our test will use.</a:t>
+            </a:r>
+          </a:p>
+          <a:p>
+            <a:pPr marL="1657350" lvl="3" indent="-285750" algn="l">
+              <a:buFont typeface="Arial" pitchFamily="34" charset="0"/>
+              <a:buChar char="•"/>
+            </a:pPr>
+            <a:r>
+              <a:rPr lang="en-US" sz="1400" b="0" baseline="0" dirty="0" smtClean="0"/>
+              <a:t>For </a:t>
+            </a:r>
+            <a:r>
+              <a:rPr lang="en-US" sz="1400" b="0" baseline="0" dirty="0" err="1" smtClean="0"/>
+              <a:t>ICalculatorService</a:t>
+            </a:r>
+            <a:r>
+              <a:rPr lang="en-US" sz="1400" b="0" baseline="0" dirty="0" smtClean="0"/>
+              <a:t> I am telling </a:t>
+            </a:r>
+            <a:r>
+              <a:rPr lang="en-US" sz="1400" b="0" baseline="0" dirty="0" err="1" smtClean="0"/>
+              <a:t>StructureMap</a:t>
+            </a:r>
+            <a:r>
+              <a:rPr lang="en-US" sz="1400" b="0" baseline="0" dirty="0" smtClean="0"/>
+              <a:t> to use the actual production </a:t>
+            </a:r>
+            <a:r>
+              <a:rPr lang="en-US" sz="1400" b="0" baseline="0" dirty="0" err="1" smtClean="0"/>
+              <a:t>CalculatorService</a:t>
+            </a:r>
+            <a:r>
+              <a:rPr lang="en-US" sz="1400" b="0" baseline="0" dirty="0" smtClean="0"/>
+              <a:t> as that is the class under test</a:t>
+            </a:r>
+          </a:p>
+          <a:p>
+            <a:pPr marL="1657350" lvl="3" indent="-285750" algn="l">
+              <a:buFont typeface="Arial" pitchFamily="34" charset="0"/>
+              <a:buChar char="•"/>
+            </a:pPr>
+            <a:r>
+              <a:rPr lang="en-US" sz="1400" b="0" baseline="0" dirty="0" smtClean="0"/>
+              <a:t>And for </a:t>
+            </a:r>
+            <a:r>
+              <a:rPr lang="en-US" sz="1400" b="0" baseline="0" dirty="0" err="1" smtClean="0"/>
+              <a:t>IValidationService</a:t>
+            </a:r>
+            <a:r>
+              <a:rPr lang="en-US" sz="1400" b="0" baseline="0" dirty="0" smtClean="0"/>
+              <a:t> I want to use the mock instance I defined in my test.</a:t>
+            </a:r>
+            <a:endParaRPr lang="en-US" sz="1400" b="0" dirty="0" smtClean="0"/>
           </a:p>
           <a:p>
             <a:pPr marL="742950" lvl="1" indent="-285750" algn="l">
@@ -6210,13 +6740,12 @@
             </a:pPr>
             <a:r>
               <a:rPr lang="en-US" sz="1400" dirty="0" smtClean="0"/>
-              <a:t>Show </a:t>
-            </a:r>
-            <a:r>
-              <a:rPr lang="en-US" sz="1400" dirty="0" err="1" smtClean="0"/>
-              <a:t>BootStrapper</a:t>
-            </a:r>
-            <a:endParaRPr lang="en-US" sz="1400" dirty="0" smtClean="0"/>
+              <a:t>Build and run…and you can see</a:t>
+            </a:r>
+            <a:r>
+              <a:rPr lang="en-US" sz="1400" baseline="0" dirty="0" smtClean="0"/>
+              <a:t> we are Green.</a:t>
+            </a:r>
           </a:p>
           <a:p>
             <a:pPr marL="742950" lvl="1" indent="-285750" algn="l">
@@ -6224,17 +6753,38 @@
               <a:buChar char="•"/>
             </a:pPr>
             <a:r>
-              <a:rPr lang="en-US" sz="1400" dirty="0" smtClean="0"/>
-              <a:t>Go to </a:t>
-            </a:r>
-            <a:r>
-              <a:rPr lang="en-US" sz="1400" dirty="0" err="1" smtClean="0"/>
+              <a:rPr lang="en-US" sz="1400" baseline="0" dirty="0" smtClean="0"/>
+              <a:t>So let’s set some breakpoints and debug our unit test so we can see what is going on</a:t>
+            </a:r>
+          </a:p>
+          <a:p>
+            <a:pPr marL="1200150" lvl="2" indent="-285750" algn="l">
+              <a:buFont typeface="Arial" pitchFamily="34" charset="0"/>
+              <a:buChar char="•"/>
+            </a:pPr>
+            <a:r>
+              <a:rPr lang="en-US" sz="1400" baseline="0" dirty="0" smtClean="0"/>
+              <a:t>Put breakpoint in </a:t>
+            </a:r>
+            <a:r>
+              <a:rPr lang="en-US" sz="1400" baseline="0" dirty="0" err="1" smtClean="0"/>
               <a:t>CalculatorService</a:t>
             </a:r>
             <a:r>
-              <a:rPr lang="en-US" sz="1400" dirty="0" smtClean="0"/>
-              <a:t> and remove constructor injection</a:t>
-            </a:r>
+              <a:rPr lang="en-US" sz="1400" baseline="0" dirty="0" smtClean="0"/>
+              <a:t> constructor</a:t>
+            </a:r>
+          </a:p>
+          <a:p>
+            <a:pPr marL="1200150" lvl="2" indent="-285750" algn="l">
+              <a:buFont typeface="Arial" pitchFamily="34" charset="0"/>
+              <a:buChar char="•"/>
+            </a:pPr>
+            <a:r>
+              <a:rPr lang="en-US" sz="1400" baseline="0" dirty="0" smtClean="0"/>
+              <a:t>And first line of Add method</a:t>
+            </a:r>
+            <a:endParaRPr lang="en-US" sz="1400" dirty="0" smtClean="0"/>
           </a:p>
           <a:p>
             <a:pPr marL="742950" lvl="1" indent="-285750" algn="l">
@@ -6243,7 +6793,15 @@
             </a:pPr>
             <a:r>
               <a:rPr lang="en-US" sz="1400" dirty="0" smtClean="0"/>
-              <a:t>Replace with </a:t>
+              <a:t>Run and note </a:t>
+            </a:r>
+            <a:r>
+              <a:rPr lang="en-US" sz="1400" dirty="0" err="1" smtClean="0"/>
+              <a:t>PlugIn</a:t>
+            </a:r>
+            <a:r>
+              <a:rPr lang="en-US" sz="1400" dirty="0" smtClean="0"/>
+              <a:t> not defined error – StructureMap is not configured</a:t>
             </a:r>
           </a:p>
           <a:p>
@@ -6253,23 +6811,77 @@
             </a:pPr>
             <a:r>
               <a:rPr lang="en-US" sz="1400" dirty="0" smtClean="0"/>
-              <a:t>Add </a:t>
-            </a:r>
-            <a:r>
-              <a:rPr lang="en-US" sz="1400" b="1" dirty="0" err="1" smtClean="0"/>
-              <a:t>DependencyResolver.GetConcreteInstanceOf</a:t>
-            </a:r>
-            <a:r>
-              <a:rPr lang="en-US" sz="1400" b="1" dirty="0" smtClean="0"/>
-              <a:t>&lt;</a:t>
-            </a:r>
-            <a:r>
-              <a:rPr lang="en-US" sz="1400" b="1" dirty="0" err="1" smtClean="0"/>
-              <a:t>IValidationService</a:t>
-            </a:r>
-            <a:r>
-              <a:rPr lang="en-US" sz="1400" b="1" dirty="0" smtClean="0"/>
-              <a:t>&gt;()</a:t>
+              <a:t>Debug unit test</a:t>
+            </a:r>
+          </a:p>
+          <a:p>
+            <a:pPr marL="1200150" lvl="2" indent="-285750" algn="l">
+              <a:buFont typeface="Arial" pitchFamily="34" charset="0"/>
+              <a:buChar char="•"/>
+            </a:pPr>
+            <a:r>
+              <a:rPr lang="en-US" sz="1400" dirty="0" smtClean="0"/>
+              <a:t>First breakpoint is in the constructor</a:t>
+            </a:r>
+          </a:p>
+          <a:p>
+            <a:pPr marL="1657350" lvl="3" indent="-285750" algn="l">
+              <a:buFont typeface="Arial" pitchFamily="34" charset="0"/>
+              <a:buChar char="•"/>
+            </a:pPr>
+            <a:r>
+              <a:rPr lang="en-US" sz="1400" dirty="0" smtClean="0"/>
+              <a:t>You can see that even though we didn’t directly call the constructor</a:t>
+            </a:r>
+            <a:r>
+              <a:rPr lang="en-US" sz="1400" baseline="0" dirty="0" smtClean="0"/>
+              <a:t> in our code it is hit via </a:t>
+            </a:r>
+            <a:r>
+              <a:rPr lang="en-US" sz="1400" baseline="0" dirty="0" err="1" smtClean="0"/>
+              <a:t>StructureMap</a:t>
+            </a:r>
+            <a:endParaRPr lang="en-US" sz="1400" baseline="0" dirty="0" smtClean="0"/>
+          </a:p>
+          <a:p>
+            <a:pPr marL="1657350" lvl="3" indent="-285750" algn="l">
+              <a:buFont typeface="Arial" pitchFamily="34" charset="0"/>
+              <a:buChar char="•"/>
+            </a:pPr>
+            <a:r>
+              <a:rPr lang="en-US" sz="1400" baseline="0" dirty="0" smtClean="0"/>
+              <a:t>And the dependencies are automatically provided…I am getting my mock </a:t>
+            </a:r>
+            <a:r>
+              <a:rPr lang="en-US" sz="1400" baseline="0" dirty="0" err="1" smtClean="0"/>
+              <a:t>ValidationService</a:t>
+            </a:r>
+            <a:endParaRPr lang="en-US" sz="1400" baseline="0" dirty="0" smtClean="0"/>
+          </a:p>
+          <a:p>
+            <a:pPr marL="1200150" lvl="2" indent="-285750" algn="l">
+              <a:buFont typeface="Arial" pitchFamily="34" charset="0"/>
+              <a:buChar char="•"/>
+            </a:pPr>
+            <a:r>
+              <a:rPr lang="en-US" sz="1400" baseline="0" dirty="0" smtClean="0"/>
+              <a:t>And as you’d expect if I continue to my second breakpoint I still have my mock </a:t>
+            </a:r>
+            <a:r>
+              <a:rPr lang="en-US" sz="1400" baseline="0" dirty="0" err="1" smtClean="0"/>
+              <a:t>ValidationService</a:t>
+            </a:r>
+            <a:r>
+              <a:rPr lang="en-US" sz="1400" baseline="0" dirty="0" smtClean="0"/>
+              <a:t> and it is used in the Add method to bypass the actual </a:t>
+            </a:r>
+            <a:r>
+              <a:rPr lang="en-US" sz="1400" baseline="0" dirty="0" err="1" smtClean="0"/>
+              <a:t>ValidationService</a:t>
+            </a:r>
+            <a:r>
+              <a:rPr lang="en-US" sz="1400" baseline="0" dirty="0" smtClean="0"/>
+              <a:t>.</a:t>
             </a:r>
           </a:p>
           <a:p>
@@ -6279,35 +6891,7 @@
             </a:pPr>
             <a:r>
               <a:rPr lang="en-US" sz="1400" dirty="0" smtClean="0"/>
-              <a:t>Build and clean up errors</a:t>
-            </a:r>
-          </a:p>
-          <a:p>
-            <a:pPr marL="742950" lvl="1" indent="-285750" algn="l">
-              <a:buFont typeface="Arial" pitchFamily="34" charset="0"/>
-              <a:buChar char="•"/>
-            </a:pPr>
-            <a:r>
-              <a:rPr lang="en-US" sz="1400" dirty="0" smtClean="0"/>
-              <a:t>Run and note </a:t>
-            </a:r>
-            <a:r>
-              <a:rPr lang="en-US" sz="1400" dirty="0" err="1" smtClean="0"/>
-              <a:t>PlugIn</a:t>
-            </a:r>
-            <a:r>
-              <a:rPr lang="en-US" sz="1400" dirty="0" smtClean="0"/>
-              <a:t> not defined error – StructureMap is not configured</a:t>
-            </a:r>
-          </a:p>
-          <a:p>
-            <a:pPr marL="742950" lvl="1" indent="-285750" algn="l">
-              <a:buFont typeface="Arial" pitchFamily="34" charset="0"/>
-              <a:buChar char="•"/>
-            </a:pPr>
-            <a:r>
-              <a:rPr lang="en-US" sz="1400" dirty="0" smtClean="0"/>
-              <a:t>So let’s configure</a:t>
+              <a:t>The result of this is</a:t>
             </a:r>
           </a:p>
           <a:p>
@@ -6316,14 +6900,13 @@
               <a:buChar char="•"/>
             </a:pPr>
             <a:r>
-              <a:rPr lang="en-US" sz="1400" b="1" dirty="0" smtClean="0"/>
-              <a:t>Add immediately before </a:t>
-            </a:r>
-            <a:r>
-              <a:rPr lang="en-US" sz="1400" b="1" i="1" u="none" dirty="0" err="1" smtClean="0"/>
-              <a:t>mockRepository.ReplayAll</a:t>
-            </a:r>
-            <a:endParaRPr lang="en-US" sz="1400" b="1" i="1" u="none" dirty="0" smtClean="0"/>
+              <a:rPr lang="en-US" sz="1400" dirty="0" smtClean="0"/>
+              <a:t>Extremely decoupled</a:t>
+            </a:r>
+            <a:r>
+              <a:rPr lang="en-US" sz="1400" baseline="0" dirty="0" smtClean="0"/>
+              <a:t> code…everything is only aware of interfaces…not contract implementations</a:t>
+            </a:r>
           </a:p>
           <a:p>
             <a:pPr marL="1200150" lvl="2" indent="-285750" algn="l">
@@ -6331,127 +6914,8 @@
               <a:buChar char="•"/>
             </a:pPr>
             <a:r>
-              <a:rPr lang="en-US" sz="1400" b="1" dirty="0" err="1" smtClean="0">
-                <a:solidFill>
-                  <a:srgbClr val="2B91AF"/>
-                </a:solidFill>
-                <a:highlight>
-                  <a:srgbClr val="FFFFFF"/>
-                </a:highlight>
-                <a:latin typeface="Consolas"/>
-              </a:rPr>
-              <a:t>ObjectFactory</a:t>
-            </a:r>
-            <a:r>
-              <a:rPr lang="en-US" sz="1400" b="1" dirty="0" err="1" smtClean="0">
-                <a:solidFill>
-                  <a:srgbClr val="000000"/>
-                </a:solidFill>
-                <a:highlight>
-                  <a:srgbClr val="FFFFFF"/>
-                </a:highlight>
-                <a:latin typeface="Consolas"/>
-              </a:rPr>
-              <a:t>.Initialize</a:t>
-            </a:r>
-            <a:r>
-              <a:rPr lang="en-US" sz="1400" b="1" dirty="0" smtClean="0">
-                <a:solidFill>
-                  <a:srgbClr val="000000"/>
-                </a:solidFill>
-                <a:highlight>
-                  <a:srgbClr val="FFFFFF"/>
-                </a:highlight>
-                <a:latin typeface="Consolas"/>
-              </a:rPr>
-              <a:t>(x =&gt; </a:t>
-            </a:r>
-            <a:r>
-              <a:rPr lang="en-US" sz="1400" b="1" dirty="0" err="1" smtClean="0">
-                <a:solidFill>
-                  <a:srgbClr val="000000"/>
-                </a:solidFill>
-                <a:highlight>
-                  <a:srgbClr val="FFFFFF"/>
-                </a:highlight>
-                <a:latin typeface="Consolas"/>
-              </a:rPr>
-              <a:t>x.For</a:t>
-            </a:r>
-            <a:r>
-              <a:rPr lang="en-US" sz="1400" b="1" dirty="0" smtClean="0">
-                <a:solidFill>
-                  <a:srgbClr val="000000"/>
-                </a:solidFill>
-                <a:highlight>
-                  <a:srgbClr val="FFFFFF"/>
-                </a:highlight>
-                <a:latin typeface="Consolas"/>
-              </a:rPr>
-              <a:t>&lt;</a:t>
-            </a:r>
-            <a:r>
-              <a:rPr lang="en-US" sz="1400" b="1" dirty="0" err="1" smtClean="0">
-                <a:solidFill>
-                  <a:srgbClr val="2B91AF"/>
-                </a:solidFill>
-                <a:highlight>
-                  <a:srgbClr val="FFFFFF"/>
-                </a:highlight>
-                <a:latin typeface="Consolas"/>
-              </a:rPr>
-              <a:t>IValidationService</a:t>
-            </a:r>
-            <a:r>
-              <a:rPr lang="en-US" sz="1400" b="1" dirty="0" smtClean="0">
-                <a:solidFill>
-                  <a:srgbClr val="000000"/>
-                </a:solidFill>
-                <a:highlight>
-                  <a:srgbClr val="FFFFFF"/>
-                </a:highlight>
-                <a:latin typeface="Consolas"/>
-              </a:rPr>
-              <a:t>&gt;().Use(_</a:t>
-            </a:r>
-            <a:r>
-              <a:rPr lang="en-US" sz="1400" b="1" dirty="0" err="1" smtClean="0">
-                <a:solidFill>
-                  <a:srgbClr val="000000"/>
-                </a:solidFill>
-                <a:highlight>
-                  <a:srgbClr val="FFFFFF"/>
-                </a:highlight>
-                <a:latin typeface="Consolas"/>
-              </a:rPr>
-              <a:t>validationService</a:t>
-            </a:r>
-            <a:r>
-              <a:rPr lang="en-US" sz="1400" b="1" dirty="0" smtClean="0">
-                <a:solidFill>
-                  <a:srgbClr val="000000"/>
-                </a:solidFill>
-                <a:highlight>
-                  <a:srgbClr val="FFFFFF"/>
-                </a:highlight>
-                <a:latin typeface="Consolas"/>
-              </a:rPr>
-              <a:t>));</a:t>
-            </a:r>
-            <a:endParaRPr lang="en-US" sz="1400" b="1" dirty="0" smtClean="0"/>
-          </a:p>
-          <a:p>
-            <a:pPr marL="742950" lvl="1" indent="-285750" algn="l">
-              <a:buFont typeface="Arial" pitchFamily="34" charset="0"/>
-              <a:buChar char="•"/>
-            </a:pPr>
-            <a:r>
-              <a:rPr lang="en-US" sz="1400" dirty="0" smtClean="0"/>
-              <a:t>Run test – and we </a:t>
-            </a:r>
-            <a:r>
-              <a:rPr lang="en-US" sz="1400" smtClean="0"/>
-              <a:t>are golden</a:t>
+              <a:rPr lang="en-US" sz="1400" baseline="0" dirty="0" smtClean="0"/>
+              <a:t>Very testable code that I can easily isolate and mock dependencies whenever need be.</a:t>
             </a:r>
             <a:endParaRPr lang="en-US" sz="1400" dirty="0" smtClean="0"/>
           </a:p>
@@ -17395,6 +17859,16 @@
             <a:r>
               <a:rPr lang="en-US" sz="2400" kern="0" dirty="0" smtClean="0"/>
               <a:t>Mocks/Fakes/Stubs</a:t>
+            </a:r>
+          </a:p>
+          <a:p>
+            <a:r>
+              <a:rPr lang="en-US" sz="2400" kern="0" dirty="0" err="1" smtClean="0"/>
+              <a:t>IoC</a:t>
+            </a:r>
+            <a:r>
+              <a:rPr lang="en-US" sz="2400" kern="0" dirty="0" smtClean="0"/>
+              <a:t> tooling rocks!</a:t>
             </a:r>
             <a:r>
               <a:rPr lang="en-US" sz="2119" kern="0" dirty="0"/>
@@ -19726,19 +20200,6 @@
 </file>
 
 <file path=customXml/item1.xml><?xml version="1.0" encoding="utf-8"?>
-<p:properties xmlns:p="http://schemas.microsoft.com/office/2006/metadata/properties" xmlns:xsi="http://www.w3.org/2001/XMLSchema-instance" xmlns:pc="http://schemas.microsoft.com/office/infopath/2007/PartnerControls">
-  <documentManagement>
-    <Description0 xmlns="1e37aee8-73ad-441e-bced-8b530ad9291b">PowerPoint template with Microsoft Partner Network logo on it.</Description0>
-    <_dlc_DocId xmlns="52ad97b0-86c1-49b5-b544-c488bf38e7c0">SAZVWXQSR7YH-3011-7</_dlc_DocId>
-    <_dlc_DocIdUrl xmlns="52ad97b0-86c1-49b5-b544-c488bf38e7c0">
-      <Url>https://my.skylinetechnologies.com/Support/SalesMarketingCenter/branding/_layouts/DocIdRedir.aspx?ID=SAZVWXQSR7YH-3011-7</Url>
-      <Description>SAZVWXQSR7YH-3011-7</Description>
-    </_dlc_DocIdUrl>
-  </documentManagement>
-</p:properties>
-</file>
-
-<file path=customXml/item2.xml><?xml version="1.0" encoding="utf-8"?>
 <ct:contentTypeSchema xmlns:ct="http://schemas.microsoft.com/office/2006/metadata/contentType" xmlns:ma="http://schemas.microsoft.com/office/2006/metadata/properties/metaAttributes" ct:_="" ma:_="" ma:contentTypeName="Document" ma:contentTypeID="0x0101004D2E750987EE2543B234B3A674D6BE3D" ma:contentTypeVersion="105" ma:contentTypeDescription="Create a new document." ma:contentTypeScope="" ma:versionID="62fa037737ae31885dcb260bd5c7d1f2">
   <xsd:schema xmlns:xsd="http://www.w3.org/2001/XMLSchema" xmlns:xs="http://www.w3.org/2001/XMLSchema" xmlns:p="http://schemas.microsoft.com/office/2006/metadata/properties" xmlns:ns2="1e37aee8-73ad-441e-bced-8b530ad9291b" xmlns:ns3="52ad97b0-86c1-49b5-b544-c488bf38e7c0" targetNamespace="http://schemas.microsoft.com/office/2006/metadata/properties" ma:root="true" ma:fieldsID="ce0d2501b4c25830d7e1734de94951c7" ns2:_="" ns3:_="">
     <xsd:import namespace="1e37aee8-73ad-441e-bced-8b530ad9291b"/>
@@ -19896,16 +20357,20 @@
 </ct:contentTypeSchema>
 </file>
 
-<file path=customXml/item3.xml><?xml version="1.0" encoding="utf-8"?>
-<?mso-contentType ?>
-<FormTemplates xmlns="http://schemas.microsoft.com/sharepoint/v3/contenttype/forms">
-  <Display>DocumentLibraryForm</Display>
-  <Edit>DocumentLibraryForm</Edit>
-  <New>DocumentLibraryForm</New>
-</FormTemplates>
+<file path=customXml/item2.xml><?xml version="1.0" encoding="utf-8"?>
+<p:properties xmlns:p="http://schemas.microsoft.com/office/2006/metadata/properties" xmlns:xsi="http://www.w3.org/2001/XMLSchema-instance" xmlns:pc="http://schemas.microsoft.com/office/infopath/2007/PartnerControls">
+  <documentManagement>
+    <Description0 xmlns="1e37aee8-73ad-441e-bced-8b530ad9291b">PowerPoint template with Microsoft Partner Network logo on it.</Description0>
+    <_dlc_DocId xmlns="52ad97b0-86c1-49b5-b544-c488bf38e7c0">SAZVWXQSR7YH-3011-7</_dlc_DocId>
+    <_dlc_DocIdUrl xmlns="52ad97b0-86c1-49b5-b544-c488bf38e7c0">
+      <Url>https://my.skylinetechnologies.com/Support/SalesMarketingCenter/branding/_layouts/DocIdRedir.aspx?ID=SAZVWXQSR7YH-3011-7</Url>
+      <Description>SAZVWXQSR7YH-3011-7</Description>
+    </_dlc_DocIdUrl>
+  </documentManagement>
+</p:properties>
 </file>
 
-<file path=customXml/item4.xml><?xml version="1.0" encoding="utf-8"?>
+<file path=customXml/item3.xml><?xml version="1.0" encoding="utf-8"?>
 <?mso-contentType ?>
 <spe:Receivers xmlns:spe="http://schemas.microsoft.com/sharepoint/events">
   <Receiver>
@@ -19951,24 +20416,16 @@
 </spe:Receivers>
 </file>
 
-<file path=customXml/itemProps1.xml><?xml version="1.0" encoding="utf-8"?>
-<ds:datastoreItem xmlns:ds="http://schemas.openxmlformats.org/officeDocument/2006/customXml" ds:itemID="{9F5040E5-4564-49C1-9147-56F1700A1C56}">
-  <ds:schemaRefs>
-    <ds:schemaRef ds:uri="http://purl.org/dc/terms/"/>
-    <ds:schemaRef ds:uri="52ad97b0-86c1-49b5-b544-c488bf38e7c0"/>
-    <ds:schemaRef ds:uri="http://schemas.openxmlformats.org/package/2006/metadata/core-properties"/>
-    <ds:schemaRef ds:uri="http://purl.org/dc/elements/1.1/"/>
-    <ds:schemaRef ds:uri="http://www.w3.org/XML/1998/namespace"/>
-    <ds:schemaRef ds:uri="http://schemas.microsoft.com/office/2006/documentManagement/types"/>
-    <ds:schemaRef ds:uri="1e37aee8-73ad-441e-bced-8b530ad9291b"/>
-    <ds:schemaRef ds:uri="http://schemas.microsoft.com/office/2006/metadata/properties"/>
-    <ds:schemaRef ds:uri="http://schemas.microsoft.com/office/infopath/2007/PartnerControls"/>
-    <ds:schemaRef ds:uri="http://purl.org/dc/dcmitype/"/>
-  </ds:schemaRefs>
-</ds:datastoreItem>
+<file path=customXml/item4.xml><?xml version="1.0" encoding="utf-8"?>
+<?mso-contentType ?>
+<FormTemplates xmlns="http://schemas.microsoft.com/sharepoint/v3/contenttype/forms">
+  <Display>DocumentLibraryForm</Display>
+  <Edit>DocumentLibraryForm</Edit>
+  <New>DocumentLibraryForm</New>
+</FormTemplates>
 </file>
 
-<file path=customXml/itemProps2.xml><?xml version="1.0" encoding="utf-8"?>
+<file path=customXml/itemProps1.xml><?xml version="1.0" encoding="utf-8"?>
 <ds:datastoreItem xmlns:ds="http://schemas.openxmlformats.org/officeDocument/2006/customXml" ds:itemID="{B03FC495-EB61-4A2C-B8E7-345CEB92DF9F}">
   <ds:schemaRefs>
     <ds:schemaRef ds:uri="http://schemas.microsoft.com/office/2006/metadata/contentType"/>
@@ -19987,18 +20444,35 @@
 </ds:datastoreItem>
 </file>
 
+<file path=customXml/itemProps2.xml><?xml version="1.0" encoding="utf-8"?>
+<ds:datastoreItem xmlns:ds="http://schemas.openxmlformats.org/officeDocument/2006/customXml" ds:itemID="{9F5040E5-4564-49C1-9147-56F1700A1C56}">
+  <ds:schemaRefs>
+    <ds:schemaRef ds:uri="http://purl.org/dc/terms/"/>
+    <ds:schemaRef ds:uri="52ad97b0-86c1-49b5-b544-c488bf38e7c0"/>
+    <ds:schemaRef ds:uri="http://schemas.openxmlformats.org/package/2006/metadata/core-properties"/>
+    <ds:schemaRef ds:uri="http://purl.org/dc/elements/1.1/"/>
+    <ds:schemaRef ds:uri="http://www.w3.org/XML/1998/namespace"/>
+    <ds:schemaRef ds:uri="http://schemas.microsoft.com/office/2006/documentManagement/types"/>
+    <ds:schemaRef ds:uri="1e37aee8-73ad-441e-bced-8b530ad9291b"/>
+    <ds:schemaRef ds:uri="http://schemas.microsoft.com/office/2006/metadata/properties"/>
+    <ds:schemaRef ds:uri="http://schemas.microsoft.com/office/infopath/2007/PartnerControls"/>
+    <ds:schemaRef ds:uri="http://purl.org/dc/dcmitype/"/>
+  </ds:schemaRefs>
+</ds:datastoreItem>
+</file>
+
 <file path=customXml/itemProps3.xml><?xml version="1.0" encoding="utf-8"?>
+<ds:datastoreItem xmlns:ds="http://schemas.openxmlformats.org/officeDocument/2006/customXml" ds:itemID="{0068A067-F354-4585-8169-FC99DA836E1C}">
+  <ds:schemaRefs>
+    <ds:schemaRef ds:uri="http://schemas.microsoft.com/sharepoint/events"/>
+  </ds:schemaRefs>
+</ds:datastoreItem>
+</file>
+
+<file path=customXml/itemProps4.xml><?xml version="1.0" encoding="utf-8"?>
 <ds:datastoreItem xmlns:ds="http://schemas.openxmlformats.org/officeDocument/2006/customXml" ds:itemID="{B6DBE1C9-0895-41F8-89A3-98DC40E912B0}">
   <ds:schemaRefs>
     <ds:schemaRef ds:uri="http://schemas.microsoft.com/sharepoint/v3/contenttype/forms"/>
   </ds:schemaRefs>
 </ds:datastoreItem>
-</file>
-
-<file path=customXml/itemProps4.xml><?xml version="1.0" encoding="utf-8"?>
-<ds:datastoreItem xmlns:ds="http://schemas.openxmlformats.org/officeDocument/2006/customXml" ds:itemID="{0068A067-F354-4585-8169-FC99DA836E1C}">
-  <ds:schemaRefs>
-    <ds:schemaRef ds:uri="http://schemas.microsoft.com/sharepoint/events"/>
-  </ds:schemaRefs>
-</ds:datastoreItem>
 </file>
</xml_diff>

<commit_message>
Got rid of all bullet points
</commit_message>
<xml_diff>
--- a/TestDrivingDotNet.pptx
+++ b/TestDrivingDotNet.pptx
@@ -6172,11 +6172,7 @@
             </a:pPr>
             <a:r>
               <a:rPr lang="en-US" sz="1200" dirty="0" smtClean="0"/>
-              <a:t>The </a:t>
-            </a:r>
-            <a:r>
-              <a:rPr lang="en-US" sz="1200" dirty="0" smtClean="0"/>
-              <a:t>act of testing piece of code, usually a method, that tests a very small piece of functionality by invoking it and verifying assumptions.</a:t>
+              <a:t>The act of testing piece of code, usually a method, that tests a very small piece of functionality by invoking it and verifying assumptions.</a:t>
             </a:r>
             <a:endParaRPr lang="en-US" sz="1200" kern="0" dirty="0" smtClean="0">
               <a:solidFill>
@@ -6486,7 +6482,7 @@
             <a:prstTxWarp prst="textNoShape">
               <a:avLst/>
             </a:prstTxWarp>
-            <a:normAutofit fontScale="77500" lnSpcReduction="20000"/>
+            <a:normAutofit fontScale="70000" lnSpcReduction="20000"/>
           </a:bodyPr>
           <a:lstStyle/>
           <a:p>
@@ -8706,7 +8702,7 @@
             <a:prstTxWarp prst="textNoShape">
               <a:avLst/>
             </a:prstTxWarp>
-            <a:normAutofit lnSpcReduction="10000"/>
+            <a:normAutofit/>
           </a:bodyPr>
           <a:lstStyle/>
           <a:p>
@@ -8793,15 +8789,7 @@
             </a:pPr>
             <a:r>
               <a:rPr lang="en-US" dirty="0" smtClean="0"/>
-              <a:t>Is the act </a:t>
-            </a:r>
-            <a:r>
-              <a:rPr lang="en-US" dirty="0" smtClean="0"/>
-              <a:t>of “injecting” the dependency’s </a:t>
-            </a:r>
-            <a:r>
-              <a:rPr lang="en-US" dirty="0" smtClean="0"/>
-              <a:t>that</a:t>
+              <a:t>Is the act of “injecting” the dependency’s that</a:t>
             </a:r>
             <a:r>
               <a:rPr lang="en-US" baseline="0" dirty="0" smtClean="0"/>
@@ -8809,11 +8797,7 @@
             </a:r>
             <a:r>
               <a:rPr lang="en-US" dirty="0" smtClean="0"/>
-              <a:t> </a:t>
-            </a:r>
-            <a:r>
-              <a:rPr lang="en-US" dirty="0" smtClean="0"/>
-              <a:t>class needs.</a:t>
+              <a:t> class needs.</a:t>
             </a:r>
           </a:p>
           <a:p>
@@ -8840,7 +8824,6 @@
               <a:rPr lang="en-US" dirty="0" smtClean="0"/>
               <a:t>Constructors</a:t>
             </a:r>
-            <a:endParaRPr lang="en-US" dirty="0" smtClean="0"/>
           </a:p>
           <a:p>
             <a:pPr marL="1200150" lvl="2" indent="-285750" algn="l">
@@ -9007,11 +8990,7 @@
             </a:pPr>
             <a:r>
               <a:rPr lang="en-US" dirty="0" smtClean="0"/>
-              <a:t>Separation </a:t>
-            </a:r>
-            <a:r>
-              <a:rPr lang="en-US" dirty="0" smtClean="0"/>
-              <a:t>of Concerns</a:t>
+              <a:t>Separation of Concerns</a:t>
             </a:r>
           </a:p>
           <a:p>
@@ -9082,15 +9061,7 @@
             </a:r>
             <a:r>
               <a:rPr lang="en-US" baseline="0" dirty="0" smtClean="0"/>
-              <a:t> talk </a:t>
-            </a:r>
-            <a:r>
-              <a:rPr lang="en-US" baseline="0" dirty="0" smtClean="0"/>
-              <a:t>about this </a:t>
-            </a:r>
-            <a:r>
-              <a:rPr lang="en-US" baseline="0" dirty="0" smtClean="0"/>
-              <a:t>much more in a bit</a:t>
+              <a:t> talk about this much more in a bit</a:t>
             </a:r>
             <a:endParaRPr lang="en-US" dirty="0" smtClean="0"/>
           </a:p>
@@ -12024,7 +11995,7 @@
               </a:spcBef>
             </a:pPr>
             <a:r>
-              <a:rPr lang="en-US" smtClean="0"/>
+              <a:rPr lang="en-US" dirty="0" smtClean="0"/>
               <a:t>Scrum most popular.  </a:t>
             </a:r>
           </a:p>
@@ -15814,11 +15785,11 @@
   <p:clrMapOvr>
     <a:masterClrMapping/>
   </p:clrMapOvr>
-  <mc:AlternateContent xmlns:mc="http://schemas.openxmlformats.org/markup-compatibility/2006">
-    <mc:Choice xmlns:p14="http://schemas.microsoft.com/office/powerpoint/2010/main" Requires="p14">
+  <mc:AlternateContent xmlns:mc="http://schemas.openxmlformats.org/markup-compatibility/2006" xmlns:p14="http://schemas.microsoft.com/office/powerpoint/2010/main">
+    <mc:Choice Requires="p14">
       <p:transition spd="slow" p14:dur="2000"/>
     </mc:Choice>
-    <mc:Fallback>
+    <mc:Fallback xmlns="">
       <p:transition spd="slow"/>
     </mc:Fallback>
   </mc:AlternateContent>
@@ -16111,11 +16082,11 @@
   <p:clrMapOvr>
     <a:masterClrMapping/>
   </p:clrMapOvr>
-  <mc:AlternateContent xmlns:mc="http://schemas.openxmlformats.org/markup-compatibility/2006">
-    <mc:Choice xmlns:p14="http://schemas.microsoft.com/office/powerpoint/2010/main" Requires="p14">
+  <mc:AlternateContent xmlns:mc="http://schemas.openxmlformats.org/markup-compatibility/2006" xmlns:p14="http://schemas.microsoft.com/office/powerpoint/2010/main">
+    <mc:Choice Requires="p14">
       <p:transition spd="slow" p14:dur="2000"/>
     </mc:Choice>
-    <mc:Fallback>
+    <mc:Fallback xmlns="">
       <p:transition spd="slow"/>
     </mc:Fallback>
   </mc:AlternateContent>
@@ -16616,11 +16587,11 @@
   <p:clrMapOvr>
     <a:masterClrMapping/>
   </p:clrMapOvr>
-  <mc:AlternateContent xmlns:mc="http://schemas.openxmlformats.org/markup-compatibility/2006">
-    <mc:Choice xmlns:p14="http://schemas.microsoft.com/office/powerpoint/2010/main" Requires="p14">
+  <mc:AlternateContent xmlns:mc="http://schemas.openxmlformats.org/markup-compatibility/2006" xmlns:p14="http://schemas.microsoft.com/office/powerpoint/2010/main">
+    <mc:Choice Requires="p14">
       <p:transition spd="slow" p14:dur="2000"/>
     </mc:Choice>
-    <mc:Fallback>
+    <mc:Fallback xmlns="">
       <p:transition spd="slow"/>
     </mc:Fallback>
   </mc:AlternateContent>
@@ -17084,11 +17055,11 @@
   <p:clrMapOvr>
     <a:masterClrMapping/>
   </p:clrMapOvr>
-  <mc:AlternateContent xmlns:mc="http://schemas.openxmlformats.org/markup-compatibility/2006">
-    <mc:Choice xmlns:p14="http://schemas.microsoft.com/office/powerpoint/2010/main" Requires="p14">
+  <mc:AlternateContent xmlns:mc="http://schemas.openxmlformats.org/markup-compatibility/2006" xmlns:p14="http://schemas.microsoft.com/office/powerpoint/2010/main">
+    <mc:Choice Requires="p14">
       <p:transition spd="slow" p14:dur="2000"/>
     </mc:Choice>
-    <mc:Fallback>
+    <mc:Fallback xmlns="">
       <p:transition spd="slow"/>
     </mc:Fallback>
   </mc:AlternateContent>
@@ -17381,11 +17352,11 @@
   <p:clrMapOvr>
     <a:masterClrMapping/>
   </p:clrMapOvr>
-  <mc:AlternateContent xmlns:mc="http://schemas.openxmlformats.org/markup-compatibility/2006">
-    <mc:Choice xmlns:p14="http://schemas.microsoft.com/office/powerpoint/2010/main" Requires="p14">
+  <mc:AlternateContent xmlns:mc="http://schemas.openxmlformats.org/markup-compatibility/2006" xmlns:p14="http://schemas.microsoft.com/office/powerpoint/2010/main">
+    <mc:Choice Requires="p14">
       <p:transition spd="slow" p14:dur="2000"/>
     </mc:Choice>
-    <mc:Fallback>
+    <mc:Fallback xmlns="">
       <p:transition spd="slow"/>
     </mc:Fallback>
   </mc:AlternateContent>
@@ -17678,11 +17649,11 @@
   <p:clrMapOvr>
     <a:masterClrMapping/>
   </p:clrMapOvr>
-  <mc:AlternateContent xmlns:mc="http://schemas.openxmlformats.org/markup-compatibility/2006">
-    <mc:Choice xmlns:p14="http://schemas.microsoft.com/office/powerpoint/2010/main" Requires="p14">
+  <mc:AlternateContent xmlns:mc="http://schemas.openxmlformats.org/markup-compatibility/2006" xmlns:p14="http://schemas.microsoft.com/office/powerpoint/2010/main">
+    <mc:Choice Requires="p14">
       <p:transition spd="slow" p14:dur="2000"/>
     </mc:Choice>
-    <mc:Fallback>
+    <mc:Fallback xmlns="">
       <p:transition spd="slow"/>
     </mc:Fallback>
   </mc:AlternateContent>
@@ -17975,11 +17946,11 @@
   <p:clrMapOvr>
     <a:masterClrMapping/>
   </p:clrMapOvr>
-  <mc:AlternateContent xmlns:mc="http://schemas.openxmlformats.org/markup-compatibility/2006">
-    <mc:Choice xmlns:p14="http://schemas.microsoft.com/office/powerpoint/2010/main" Requires="p14">
+  <mc:AlternateContent xmlns:mc="http://schemas.openxmlformats.org/markup-compatibility/2006" xmlns:p14="http://schemas.microsoft.com/office/powerpoint/2010/main">
+    <mc:Choice Requires="p14">
       <p:transition spd="slow" p14:dur="2000"/>
     </mc:Choice>
-    <mc:Fallback>
+    <mc:Fallback xmlns="">
       <p:transition spd="slow"/>
     </mc:Fallback>
   </mc:AlternateContent>
@@ -18251,96 +18222,9 @@
   <p:timing>
     <p:tnLst>
       <p:par>
-        <p:cTn id="1" dur="indefinite" restart="never" nodeType="tmRoot">
-          <p:childTnLst>
-            <p:seq concurrent="1" nextAc="seek">
-              <p:cTn id="2" dur="indefinite" nodeType="mainSeq">
-                <p:childTnLst>
-                  <p:par>
-                    <p:cTn id="3" fill="hold">
-                      <p:stCondLst>
-                        <p:cond delay="indefinite"/>
-                        <p:cond evt="onBegin" delay="0">
-                          <p:tn val="2"/>
-                        </p:cond>
-                      </p:stCondLst>
-                      <p:childTnLst>
-                        <p:par>
-                          <p:cTn id="4" fill="hold">
-                            <p:stCondLst>
-                              <p:cond delay="0"/>
-                            </p:stCondLst>
-                            <p:childTnLst>
-                              <p:par>
-                                <p:cTn id="5" presetID="10" presetClass="entr" presetSubtype="0" fill="hold" grpId="0" nodeType="afterEffect" nodePh="1">
-                                  <p:stCondLst>
-                                    <p:cond delay="0"/>
-                                  </p:stCondLst>
-                                  <p:endCondLst>
-                                    <p:cond evt="begin" delay="0">
-                                      <p:tn val="5"/>
-                                    </p:cond>
-                                  </p:endCondLst>
-                                  <p:childTnLst>
-                                    <p:set>
-                                      <p:cBhvr>
-                                        <p:cTn id="6" dur="1" fill="hold">
-                                          <p:stCondLst>
-                                            <p:cond delay="0"/>
-                                          </p:stCondLst>
-                                        </p:cTn>
-                                        <p:tgtEl>
-                                          <p:spTgt spid="7"/>
-                                        </p:tgtEl>
-                                        <p:attrNameLst>
-                                          <p:attrName>style.visibility</p:attrName>
-                                        </p:attrNameLst>
-                                      </p:cBhvr>
-                                      <p:to>
-                                        <p:strVal val="visible"/>
-                                      </p:to>
-                                    </p:set>
-                                    <p:animEffect transition="in" filter="fade">
-                                      <p:cBhvr>
-                                        <p:cTn id="7" dur="500"/>
-                                        <p:tgtEl>
-                                          <p:spTgt spid="7"/>
-                                        </p:tgtEl>
-                                      </p:cBhvr>
-                                    </p:animEffect>
-                                  </p:childTnLst>
-                                </p:cTn>
-                              </p:par>
-                            </p:childTnLst>
-                          </p:cTn>
-                        </p:par>
-                      </p:childTnLst>
-                    </p:cTn>
-                  </p:par>
-                </p:childTnLst>
-              </p:cTn>
-              <p:prevCondLst>
-                <p:cond evt="onPrev" delay="0">
-                  <p:tgtEl>
-                    <p:sldTgt/>
-                  </p:tgtEl>
-                </p:cond>
-              </p:prevCondLst>
-              <p:nextCondLst>
-                <p:cond evt="onNext" delay="0">
-                  <p:tgtEl>
-                    <p:sldTgt/>
-                  </p:tgtEl>
-                </p:cond>
-              </p:nextCondLst>
-            </p:seq>
-          </p:childTnLst>
-        </p:cTn>
+        <p:cTn id="1" dur="indefinite" restart="never" nodeType="tmRoot"/>
       </p:par>
     </p:tnLst>
-    <p:bldLst>
-      <p:bldP spid="7" grpId="0"/>
-    </p:bldLst>
   </p:timing>
 </p:sld>
 </file>
@@ -18673,11 +18557,7 @@
             </a:pPr>
             <a:r>
               <a:rPr lang="en-US" dirty="0" smtClean="0"/>
-              <a:t>Key </a:t>
-            </a:r>
-            <a:r>
-              <a:rPr lang="en-US" dirty="0" smtClean="0"/>
-              <a:t>to TDD</a:t>
+              <a:t>Key to TDD</a:t>
             </a:r>
           </a:p>
         </p:txBody>
@@ -19195,58 +19075,14 @@
                             </p:stCondLst>
                             <p:childTnLst>
                               <p:par>
-                                <p:cTn id="5" presetID="10" presetClass="entr" presetSubtype="0" fill="hold" nodeType="afterEffect">
-                                  <p:stCondLst>
-                                    <p:cond delay="500"/>
-                                  </p:stCondLst>
-                                  <p:childTnLst>
-                                    <p:set>
-                                      <p:cBhvr>
-                                        <p:cTn id="6" dur="1" fill="hold">
-                                          <p:stCondLst>
-                                            <p:cond delay="0"/>
-                                          </p:stCondLst>
-                                        </p:cTn>
-                                        <p:tgtEl>
-                                          <p:spTgt spid="6"/>
-                                        </p:tgtEl>
-                                        <p:attrNameLst>
-                                          <p:attrName>style.visibility</p:attrName>
-                                        </p:attrNameLst>
-                                      </p:cBhvr>
-                                      <p:to>
-                                        <p:strVal val="visible"/>
-                                      </p:to>
-                                    </p:set>
-                                    <p:animEffect transition="in" filter="fade">
-                                      <p:cBhvr>
-                                        <p:cTn id="7" dur="500"/>
-                                        <p:tgtEl>
-                                          <p:spTgt spid="6"/>
-                                        </p:tgtEl>
-                                      </p:cBhvr>
-                                    </p:animEffect>
-                                  </p:childTnLst>
-                                </p:cTn>
-                              </p:par>
-                            </p:childTnLst>
-                          </p:cTn>
-                        </p:par>
-                        <p:par>
-                          <p:cTn id="8" fill="hold">
-                            <p:stCondLst>
-                              <p:cond delay="1000"/>
-                            </p:stCondLst>
-                            <p:childTnLst>
-                              <p:par>
-                                <p:cTn id="9" presetID="10" presetClass="entr" presetSubtype="0" fill="hold" grpId="0" nodeType="afterEffect">
+                                <p:cTn id="5" presetID="10" presetClass="entr" presetSubtype="0" fill="hold" grpId="0" nodeType="afterEffect">
                                   <p:stCondLst>
                                     <p:cond delay="2000"/>
                                   </p:stCondLst>
                                   <p:childTnLst>
                                     <p:set>
                                       <p:cBhvr>
-                                        <p:cTn id="10" dur="1" fill="hold">
+                                        <p:cTn id="6" dur="1" fill="hold">
                                           <p:stCondLst>
                                             <p:cond delay="0"/>
                                           </p:stCondLst>
@@ -19264,7 +19100,7 @@
                                     </p:set>
                                     <p:animEffect transition="in" filter="fade">
                                       <p:cBhvr>
-                                        <p:cTn id="11" dur="500"/>
+                                        <p:cTn id="7" dur="500"/>
                                         <p:tgtEl>
                                           <p:spTgt spid="10"/>
                                         </p:tgtEl>
@@ -19351,7 +19187,6 @@
               <a:rPr lang="en-US" dirty="0" smtClean="0"/>
               <a:t>Single Responsibility</a:t>
             </a:r>
-            <a:endParaRPr lang="en-US" dirty="0" smtClean="0"/>
           </a:p>
         </p:txBody>
       </p:sp>
@@ -19445,7 +19280,6 @@
               <a:rPr lang="en-US" dirty="0" smtClean="0"/>
               <a:t>Interfaces Not Implementations</a:t>
             </a:r>
-            <a:endParaRPr lang="en-US" dirty="0" smtClean="0"/>
           </a:p>
         </p:txBody>
       </p:sp>
@@ -19539,7 +19373,6 @@
               <a:rPr lang="en-US" dirty="0" smtClean="0"/>
               <a:t>Depend on Abstractions</a:t>
             </a:r>
-            <a:endParaRPr lang="en-US" dirty="0" smtClean="0"/>
           </a:p>
         </p:txBody>
       </p:sp>
@@ -19653,7 +19486,6 @@
               <a:rPr lang="en-US" dirty="0" smtClean="0"/>
               <a:t>-Refactor</a:t>
             </a:r>
-            <a:endParaRPr lang="en-US" dirty="0" smtClean="0"/>
           </a:p>
         </p:txBody>
       </p:sp>
@@ -19785,7 +19617,6 @@
               <a:rPr lang="en-US" dirty="0" smtClean="0"/>
               <a:t>Arrange-Act-Assert</a:t>
             </a:r>
-            <a:endParaRPr lang="en-US" dirty="0" smtClean="0"/>
           </a:p>
         </p:txBody>
       </p:sp>
@@ -20631,86 +20462,7 @@
   <p:timing>
     <p:tnLst>
       <p:par>
-        <p:cTn id="1" dur="indefinite" restart="never" nodeType="tmRoot">
-          <p:childTnLst>
-            <p:seq concurrent="1" nextAc="seek">
-              <p:cTn id="2" dur="indefinite" nodeType="mainSeq">
-                <p:childTnLst>
-                  <p:par>
-                    <p:cTn id="3" fill="hold">
-                      <p:stCondLst>
-                        <p:cond delay="indefinite"/>
-                        <p:cond evt="onBegin" delay="0">
-                          <p:tn val="2"/>
-                        </p:cond>
-                      </p:stCondLst>
-                      <p:childTnLst>
-                        <p:par>
-                          <p:cTn id="4" fill="hold">
-                            <p:stCondLst>
-                              <p:cond delay="0"/>
-                            </p:stCondLst>
-                            <p:childTnLst>
-                              <p:par>
-                                <p:cTn id="5" presetID="10" presetClass="entr" presetSubtype="0" fill="hold" nodeType="afterEffect">
-                                  <p:stCondLst>
-                                    <p:cond delay="0"/>
-                                  </p:stCondLst>
-                                  <p:childTnLst>
-                                    <p:set>
-                                      <p:cBhvr>
-                                        <p:cTn id="6" dur="1" fill="hold">
-                                          <p:stCondLst>
-                                            <p:cond delay="0"/>
-                                          </p:stCondLst>
-                                        </p:cTn>
-                                        <p:tgtEl>
-                                          <p:spTgt spid="6"/>
-                                        </p:tgtEl>
-                                        <p:attrNameLst>
-                                          <p:attrName>style.visibility</p:attrName>
-                                        </p:attrNameLst>
-                                      </p:cBhvr>
-                                      <p:to>
-                                        <p:strVal val="visible"/>
-                                      </p:to>
-                                    </p:set>
-                                    <p:animEffect transition="in" filter="fade">
-                                      <p:cBhvr>
-                                        <p:cTn id="7" dur="500"/>
-                                        <p:tgtEl>
-                                          <p:spTgt spid="6"/>
-                                        </p:tgtEl>
-                                      </p:cBhvr>
-                                    </p:animEffect>
-                                  </p:childTnLst>
-                                </p:cTn>
-                              </p:par>
-                            </p:childTnLst>
-                          </p:cTn>
-                        </p:par>
-                      </p:childTnLst>
-                    </p:cTn>
-                  </p:par>
-                </p:childTnLst>
-              </p:cTn>
-              <p:prevCondLst>
-                <p:cond evt="onPrev" delay="0">
-                  <p:tgtEl>
-                    <p:sldTgt/>
-                  </p:tgtEl>
-                </p:cond>
-              </p:prevCondLst>
-              <p:nextCondLst>
-                <p:cond evt="onNext" delay="0">
-                  <p:tgtEl>
-                    <p:sldTgt/>
-                  </p:tgtEl>
-                </p:cond>
-              </p:nextCondLst>
-            </p:seq>
-          </p:childTnLst>
-        </p:cTn>
+        <p:cTn id="1" dur="indefinite" restart="never" nodeType="tmRoot"/>
       </p:par>
     </p:tnLst>
   </p:timing>
@@ -20995,86 +20747,7 @@
   <p:timing>
     <p:tnLst>
       <p:par>
-        <p:cTn id="1" dur="indefinite" restart="never" nodeType="tmRoot">
-          <p:childTnLst>
-            <p:seq concurrent="1" nextAc="seek">
-              <p:cTn id="2" dur="indefinite" nodeType="mainSeq">
-                <p:childTnLst>
-                  <p:par>
-                    <p:cTn id="3" fill="hold">
-                      <p:stCondLst>
-                        <p:cond delay="indefinite"/>
-                        <p:cond evt="onBegin" delay="0">
-                          <p:tn val="2"/>
-                        </p:cond>
-                      </p:stCondLst>
-                      <p:childTnLst>
-                        <p:par>
-                          <p:cTn id="4" fill="hold">
-                            <p:stCondLst>
-                              <p:cond delay="0"/>
-                            </p:stCondLst>
-                            <p:childTnLst>
-                              <p:par>
-                                <p:cTn id="5" presetID="10" presetClass="entr" presetSubtype="0" fill="hold" nodeType="afterEffect">
-                                  <p:stCondLst>
-                                    <p:cond delay="0"/>
-                                  </p:stCondLst>
-                                  <p:childTnLst>
-                                    <p:set>
-                                      <p:cBhvr>
-                                        <p:cTn id="6" dur="1" fill="hold">
-                                          <p:stCondLst>
-                                            <p:cond delay="0"/>
-                                          </p:stCondLst>
-                                        </p:cTn>
-                                        <p:tgtEl>
-                                          <p:spTgt spid="4"/>
-                                        </p:tgtEl>
-                                        <p:attrNameLst>
-                                          <p:attrName>style.visibility</p:attrName>
-                                        </p:attrNameLst>
-                                      </p:cBhvr>
-                                      <p:to>
-                                        <p:strVal val="visible"/>
-                                      </p:to>
-                                    </p:set>
-                                    <p:animEffect transition="in" filter="fade">
-                                      <p:cBhvr>
-                                        <p:cTn id="7" dur="500"/>
-                                        <p:tgtEl>
-                                          <p:spTgt spid="4"/>
-                                        </p:tgtEl>
-                                      </p:cBhvr>
-                                    </p:animEffect>
-                                  </p:childTnLst>
-                                </p:cTn>
-                              </p:par>
-                            </p:childTnLst>
-                          </p:cTn>
-                        </p:par>
-                      </p:childTnLst>
-                    </p:cTn>
-                  </p:par>
-                </p:childTnLst>
-              </p:cTn>
-              <p:prevCondLst>
-                <p:cond evt="onPrev" delay="0">
-                  <p:tgtEl>
-                    <p:sldTgt/>
-                  </p:tgtEl>
-                </p:cond>
-              </p:prevCondLst>
-              <p:nextCondLst>
-                <p:cond evt="onNext" delay="0">
-                  <p:tgtEl>
-                    <p:sldTgt/>
-                  </p:tgtEl>
-                </p:cond>
-              </p:nextCondLst>
-            </p:seq>
-          </p:childTnLst>
-        </p:cTn>
+        <p:cTn id="1" dur="indefinite" restart="never" nodeType="tmRoot"/>
       </p:par>
     </p:tnLst>
   </p:timing>
@@ -21470,86 +21143,7 @@
   <p:timing>
     <p:tnLst>
       <p:par>
-        <p:cTn id="1" dur="indefinite" restart="never" nodeType="tmRoot">
-          <p:childTnLst>
-            <p:seq concurrent="1" nextAc="seek">
-              <p:cTn id="2" dur="indefinite" nodeType="mainSeq">
-                <p:childTnLst>
-                  <p:par>
-                    <p:cTn id="3" fill="hold">
-                      <p:stCondLst>
-                        <p:cond delay="indefinite"/>
-                        <p:cond evt="onBegin" delay="0">
-                          <p:tn val="2"/>
-                        </p:cond>
-                      </p:stCondLst>
-                      <p:childTnLst>
-                        <p:par>
-                          <p:cTn id="4" fill="hold">
-                            <p:stCondLst>
-                              <p:cond delay="0"/>
-                            </p:stCondLst>
-                            <p:childTnLst>
-                              <p:par>
-                                <p:cTn id="5" presetID="10" presetClass="entr" presetSubtype="0" fill="hold" nodeType="withEffect">
-                                  <p:stCondLst>
-                                    <p:cond delay="0"/>
-                                  </p:stCondLst>
-                                  <p:childTnLst>
-                                    <p:set>
-                                      <p:cBhvr>
-                                        <p:cTn id="6" dur="1" fill="hold">
-                                          <p:stCondLst>
-                                            <p:cond delay="0"/>
-                                          </p:stCondLst>
-                                        </p:cTn>
-                                        <p:tgtEl>
-                                          <p:spTgt spid="5"/>
-                                        </p:tgtEl>
-                                        <p:attrNameLst>
-                                          <p:attrName>style.visibility</p:attrName>
-                                        </p:attrNameLst>
-                                      </p:cBhvr>
-                                      <p:to>
-                                        <p:strVal val="visible"/>
-                                      </p:to>
-                                    </p:set>
-                                    <p:animEffect transition="in" filter="fade">
-                                      <p:cBhvr>
-                                        <p:cTn id="7" dur="500"/>
-                                        <p:tgtEl>
-                                          <p:spTgt spid="5"/>
-                                        </p:tgtEl>
-                                      </p:cBhvr>
-                                    </p:animEffect>
-                                  </p:childTnLst>
-                                </p:cTn>
-                              </p:par>
-                            </p:childTnLst>
-                          </p:cTn>
-                        </p:par>
-                      </p:childTnLst>
-                    </p:cTn>
-                  </p:par>
-                </p:childTnLst>
-              </p:cTn>
-              <p:prevCondLst>
-                <p:cond evt="onPrev" delay="0">
-                  <p:tgtEl>
-                    <p:sldTgt/>
-                  </p:tgtEl>
-                </p:cond>
-              </p:prevCondLst>
-              <p:nextCondLst>
-                <p:cond evt="onNext" delay="0">
-                  <p:tgtEl>
-                    <p:sldTgt/>
-                  </p:tgtEl>
-                </p:cond>
-              </p:nextCondLst>
-            </p:seq>
-          </p:childTnLst>
-        </p:cTn>
+        <p:cTn id="1" dur="indefinite" restart="never" nodeType="tmRoot"/>
       </p:par>
     </p:tnLst>
   </p:timing>
@@ -21811,212 +21405,9 @@
   <p:timing>
     <p:tnLst>
       <p:par>
-        <p:cTn id="1" dur="indefinite" restart="never" nodeType="tmRoot">
-          <p:childTnLst>
-            <p:seq concurrent="1" nextAc="seek">
-              <p:cTn id="2" dur="indefinite" nodeType="mainSeq">
-                <p:childTnLst>
-                  <p:par>
-                    <p:cTn id="3" fill="hold">
-                      <p:stCondLst>
-                        <p:cond delay="indefinite"/>
-                      </p:stCondLst>
-                      <p:childTnLst>
-                        <p:par>
-                          <p:cTn id="4" fill="hold">
-                            <p:stCondLst>
-                              <p:cond delay="0"/>
-                            </p:stCondLst>
-                            <p:childTnLst>
-                              <p:par>
-                                <p:cTn id="5" presetID="10" presetClass="entr" presetSubtype="0" fill="hold" nodeType="clickEffect">
-                                  <p:stCondLst>
-                                    <p:cond delay="0"/>
-                                  </p:stCondLst>
-                                  <p:childTnLst>
-                                    <p:set>
-                                      <p:cBhvr>
-                                        <p:cTn id="6" dur="1" fill="hold">
-                                          <p:stCondLst>
-                                            <p:cond delay="0"/>
-                                          </p:stCondLst>
-                                        </p:cTn>
-                                        <p:tgtEl>
-                                          <p:spTgt spid="1026"/>
-                                        </p:tgtEl>
-                                        <p:attrNameLst>
-                                          <p:attrName>style.visibility</p:attrName>
-                                        </p:attrNameLst>
-                                      </p:cBhvr>
-                                      <p:to>
-                                        <p:strVal val="visible"/>
-                                      </p:to>
-                                    </p:set>
-                                    <p:animEffect transition="in" filter="fade">
-                                      <p:cBhvr>
-                                        <p:cTn id="7" dur="500"/>
-                                        <p:tgtEl>
-                                          <p:spTgt spid="1026"/>
-                                        </p:tgtEl>
-                                      </p:cBhvr>
-                                    </p:animEffect>
-                                  </p:childTnLst>
-                                </p:cTn>
-                              </p:par>
-                              <p:par>
-                                <p:cTn id="8" presetID="10" presetClass="entr" presetSubtype="0" fill="hold" grpId="0" nodeType="withEffect">
-                                  <p:stCondLst>
-                                    <p:cond delay="0"/>
-                                  </p:stCondLst>
-                                  <p:childTnLst>
-                                    <p:set>
-                                      <p:cBhvr>
-                                        <p:cTn id="9" dur="1" fill="hold">
-                                          <p:stCondLst>
-                                            <p:cond delay="0"/>
-                                          </p:stCondLst>
-                                        </p:cTn>
-                                        <p:tgtEl>
-                                          <p:spTgt spid="7"/>
-                                        </p:tgtEl>
-                                        <p:attrNameLst>
-                                          <p:attrName>style.visibility</p:attrName>
-                                        </p:attrNameLst>
-                                      </p:cBhvr>
-                                      <p:to>
-                                        <p:strVal val="visible"/>
-                                      </p:to>
-                                    </p:set>
-                                    <p:animEffect transition="in" filter="fade">
-                                      <p:cBhvr>
-                                        <p:cTn id="10" dur="500"/>
-                                        <p:tgtEl>
-                                          <p:spTgt spid="7"/>
-                                        </p:tgtEl>
-                                      </p:cBhvr>
-                                    </p:animEffect>
-                                  </p:childTnLst>
-                                </p:cTn>
-                              </p:par>
-                            </p:childTnLst>
-                          </p:cTn>
-                        </p:par>
-                      </p:childTnLst>
-                    </p:cTn>
-                  </p:par>
-                  <p:par>
-                    <p:cTn id="11" fill="hold">
-                      <p:stCondLst>
-                        <p:cond delay="indefinite"/>
-                      </p:stCondLst>
-                      <p:childTnLst>
-                        <p:par>
-                          <p:cTn id="12" fill="hold">
-                            <p:stCondLst>
-                              <p:cond delay="0"/>
-                            </p:stCondLst>
-                            <p:childTnLst>
-                              <p:par>
-                                <p:cTn id="13" presetID="10" presetClass="entr" presetSubtype="0" fill="hold" grpId="0" nodeType="clickEffect">
-                                  <p:stCondLst>
-                                    <p:cond delay="0"/>
-                                  </p:stCondLst>
-                                  <p:childTnLst>
-                                    <p:set>
-                                      <p:cBhvr>
-                                        <p:cTn id="14" dur="1" fill="hold">
-                                          <p:stCondLst>
-                                            <p:cond delay="0"/>
-                                          </p:stCondLst>
-                                        </p:cTn>
-                                        <p:tgtEl>
-                                          <p:spTgt spid="8"/>
-                                        </p:tgtEl>
-                                        <p:attrNameLst>
-                                          <p:attrName>style.visibility</p:attrName>
-                                        </p:attrNameLst>
-                                      </p:cBhvr>
-                                      <p:to>
-                                        <p:strVal val="visible"/>
-                                      </p:to>
-                                    </p:set>
-                                    <p:animEffect transition="in" filter="fade">
-                                      <p:cBhvr>
-                                        <p:cTn id="15" dur="500"/>
-                                        <p:tgtEl>
-                                          <p:spTgt spid="8"/>
-                                        </p:tgtEl>
-                                      </p:cBhvr>
-                                    </p:animEffect>
-                                  </p:childTnLst>
-                                </p:cTn>
-                              </p:par>
-                              <p:par>
-                                <p:cTn id="16" presetID="10" presetClass="entr" presetSubtype="0" fill="hold" nodeType="withEffect">
-                                  <p:stCondLst>
-                                    <p:cond delay="0"/>
-                                  </p:stCondLst>
-                                  <p:childTnLst>
-                                    <p:set>
-                                      <p:cBhvr>
-                                        <p:cTn id="17" dur="1" fill="hold">
-                                          <p:stCondLst>
-                                            <p:cond delay="0"/>
-                                          </p:stCondLst>
-                                        </p:cTn>
-                                        <p:tgtEl>
-                                          <p:spTgt spid="1028"/>
-                                        </p:tgtEl>
-                                        <p:attrNameLst>
-                                          <p:attrName>style.visibility</p:attrName>
-                                        </p:attrNameLst>
-                                      </p:cBhvr>
-                                      <p:to>
-                                        <p:strVal val="visible"/>
-                                      </p:to>
-                                    </p:set>
-                                    <p:animEffect transition="in" filter="fade">
-                                      <p:cBhvr>
-                                        <p:cTn id="18" dur="500"/>
-                                        <p:tgtEl>
-                                          <p:spTgt spid="1028"/>
-                                        </p:tgtEl>
-                                      </p:cBhvr>
-                                    </p:animEffect>
-                                  </p:childTnLst>
-                                </p:cTn>
-                              </p:par>
-                            </p:childTnLst>
-                          </p:cTn>
-                        </p:par>
-                      </p:childTnLst>
-                    </p:cTn>
-                  </p:par>
-                </p:childTnLst>
-              </p:cTn>
-              <p:prevCondLst>
-                <p:cond evt="onPrev" delay="0">
-                  <p:tgtEl>
-                    <p:sldTgt/>
-                  </p:tgtEl>
-                </p:cond>
-              </p:prevCondLst>
-              <p:nextCondLst>
-                <p:cond evt="onNext" delay="0">
-                  <p:tgtEl>
-                    <p:sldTgt/>
-                  </p:tgtEl>
-                </p:cond>
-              </p:nextCondLst>
-            </p:seq>
-          </p:childTnLst>
-        </p:cTn>
+        <p:cTn id="1" dur="indefinite" restart="never" nodeType="tmRoot"/>
       </p:par>
     </p:tnLst>
-    <p:bldLst>
-      <p:bldP spid="7" grpId="0"/>
-      <p:bldP spid="8" grpId="0"/>
-    </p:bldLst>
   </p:timing>
 </p:sld>
 </file>
@@ -22123,86 +21514,7 @@
   <p:timing>
     <p:tnLst>
       <p:par>
-        <p:cTn id="1" dur="indefinite" restart="never" nodeType="tmRoot">
-          <p:childTnLst>
-            <p:seq concurrent="1" nextAc="seek">
-              <p:cTn id="2" dur="indefinite" nodeType="mainSeq">
-                <p:childTnLst>
-                  <p:par>
-                    <p:cTn id="3" fill="hold">
-                      <p:stCondLst>
-                        <p:cond delay="indefinite"/>
-                        <p:cond evt="onBegin" delay="0">
-                          <p:tn val="2"/>
-                        </p:cond>
-                      </p:stCondLst>
-                      <p:childTnLst>
-                        <p:par>
-                          <p:cTn id="4" fill="hold">
-                            <p:stCondLst>
-                              <p:cond delay="0"/>
-                            </p:stCondLst>
-                            <p:childTnLst>
-                              <p:par>
-                                <p:cTn id="5" presetID="10" presetClass="entr" presetSubtype="0" fill="hold" nodeType="afterEffect">
-                                  <p:stCondLst>
-                                    <p:cond delay="0"/>
-                                  </p:stCondLst>
-                                  <p:childTnLst>
-                                    <p:set>
-                                      <p:cBhvr>
-                                        <p:cTn id="6" dur="1" fill="hold">
-                                          <p:stCondLst>
-                                            <p:cond delay="0"/>
-                                          </p:stCondLst>
-                                        </p:cTn>
-                                        <p:tgtEl>
-                                          <p:spTgt spid="4"/>
-                                        </p:tgtEl>
-                                        <p:attrNameLst>
-                                          <p:attrName>style.visibility</p:attrName>
-                                        </p:attrNameLst>
-                                      </p:cBhvr>
-                                      <p:to>
-                                        <p:strVal val="visible"/>
-                                      </p:to>
-                                    </p:set>
-                                    <p:animEffect transition="in" filter="fade">
-                                      <p:cBhvr>
-                                        <p:cTn id="7" dur="500"/>
-                                        <p:tgtEl>
-                                          <p:spTgt spid="4"/>
-                                        </p:tgtEl>
-                                      </p:cBhvr>
-                                    </p:animEffect>
-                                  </p:childTnLst>
-                                </p:cTn>
-                              </p:par>
-                            </p:childTnLst>
-                          </p:cTn>
-                        </p:par>
-                      </p:childTnLst>
-                    </p:cTn>
-                  </p:par>
-                </p:childTnLst>
-              </p:cTn>
-              <p:prevCondLst>
-                <p:cond evt="onPrev" delay="0">
-                  <p:tgtEl>
-                    <p:sldTgt/>
-                  </p:tgtEl>
-                </p:cond>
-              </p:prevCondLst>
-              <p:nextCondLst>
-                <p:cond evt="onNext" delay="0">
-                  <p:tgtEl>
-                    <p:sldTgt/>
-                  </p:tgtEl>
-                </p:cond>
-              </p:nextCondLst>
-            </p:seq>
-          </p:childTnLst>
-        </p:cTn>
+        <p:cTn id="1" dur="indefinite" restart="never" nodeType="tmRoot"/>
       </p:par>
     </p:tnLst>
   </p:timing>
@@ -22672,86 +21984,7 @@
   <p:timing>
     <p:tnLst>
       <p:par>
-        <p:cTn id="1" dur="indefinite" restart="never" nodeType="tmRoot">
-          <p:childTnLst>
-            <p:seq concurrent="1" nextAc="seek">
-              <p:cTn id="2" dur="indefinite" nodeType="mainSeq">
-                <p:childTnLst>
-                  <p:par>
-                    <p:cTn id="3" fill="hold">
-                      <p:stCondLst>
-                        <p:cond delay="indefinite"/>
-                        <p:cond evt="onBegin" delay="0">
-                          <p:tn val="2"/>
-                        </p:cond>
-                      </p:stCondLst>
-                      <p:childTnLst>
-                        <p:par>
-                          <p:cTn id="4" fill="hold">
-                            <p:stCondLst>
-                              <p:cond delay="0"/>
-                            </p:stCondLst>
-                            <p:childTnLst>
-                              <p:par>
-                                <p:cTn id="5" presetID="10" presetClass="entr" presetSubtype="0" fill="hold" nodeType="afterEffect">
-                                  <p:stCondLst>
-                                    <p:cond delay="0"/>
-                                  </p:stCondLst>
-                                  <p:childTnLst>
-                                    <p:set>
-                                      <p:cBhvr>
-                                        <p:cTn id="6" dur="1" fill="hold">
-                                          <p:stCondLst>
-                                            <p:cond delay="0"/>
-                                          </p:stCondLst>
-                                        </p:cTn>
-                                        <p:tgtEl>
-                                          <p:spTgt spid="5"/>
-                                        </p:tgtEl>
-                                        <p:attrNameLst>
-                                          <p:attrName>style.visibility</p:attrName>
-                                        </p:attrNameLst>
-                                      </p:cBhvr>
-                                      <p:to>
-                                        <p:strVal val="visible"/>
-                                      </p:to>
-                                    </p:set>
-                                    <p:animEffect transition="in" filter="fade">
-                                      <p:cBhvr>
-                                        <p:cTn id="7" dur="500"/>
-                                        <p:tgtEl>
-                                          <p:spTgt spid="5"/>
-                                        </p:tgtEl>
-                                      </p:cBhvr>
-                                    </p:animEffect>
-                                  </p:childTnLst>
-                                </p:cTn>
-                              </p:par>
-                            </p:childTnLst>
-                          </p:cTn>
-                        </p:par>
-                      </p:childTnLst>
-                    </p:cTn>
-                  </p:par>
-                </p:childTnLst>
-              </p:cTn>
-              <p:prevCondLst>
-                <p:cond evt="onPrev" delay="0">
-                  <p:tgtEl>
-                    <p:sldTgt/>
-                  </p:tgtEl>
-                </p:cond>
-              </p:prevCondLst>
-              <p:nextCondLst>
-                <p:cond evt="onNext" delay="0">
-                  <p:tgtEl>
-                    <p:sldTgt/>
-                  </p:tgtEl>
-                </p:cond>
-              </p:nextCondLst>
-            </p:seq>
-          </p:childTnLst>
-        </p:cTn>
+        <p:cTn id="1" dur="indefinite" restart="never" nodeType="tmRoot"/>
       </p:par>
     </p:tnLst>
   </p:timing>
@@ -23549,86 +22782,7 @@
   <p:timing>
     <p:tnLst>
       <p:par>
-        <p:cTn id="1" dur="indefinite" restart="never" nodeType="tmRoot">
-          <p:childTnLst>
-            <p:seq concurrent="1" nextAc="seek">
-              <p:cTn id="2" dur="indefinite" nodeType="mainSeq">
-                <p:childTnLst>
-                  <p:par>
-                    <p:cTn id="3" fill="hold">
-                      <p:stCondLst>
-                        <p:cond delay="indefinite"/>
-                        <p:cond evt="onBegin" delay="0">
-                          <p:tn val="2"/>
-                        </p:cond>
-                      </p:stCondLst>
-                      <p:childTnLst>
-                        <p:par>
-                          <p:cTn id="4" fill="hold">
-                            <p:stCondLst>
-                              <p:cond delay="0"/>
-                            </p:stCondLst>
-                            <p:childTnLst>
-                              <p:par>
-                                <p:cTn id="5" presetID="10" presetClass="entr" presetSubtype="0" fill="hold" nodeType="afterEffect">
-                                  <p:stCondLst>
-                                    <p:cond delay="500"/>
-                                  </p:stCondLst>
-                                  <p:childTnLst>
-                                    <p:set>
-                                      <p:cBhvr>
-                                        <p:cTn id="6" dur="1" fill="hold">
-                                          <p:stCondLst>
-                                            <p:cond delay="0"/>
-                                          </p:stCondLst>
-                                        </p:cTn>
-                                        <p:tgtEl>
-                                          <p:spTgt spid="8"/>
-                                        </p:tgtEl>
-                                        <p:attrNameLst>
-                                          <p:attrName>style.visibility</p:attrName>
-                                        </p:attrNameLst>
-                                      </p:cBhvr>
-                                      <p:to>
-                                        <p:strVal val="visible"/>
-                                      </p:to>
-                                    </p:set>
-                                    <p:animEffect transition="in" filter="fade">
-                                      <p:cBhvr>
-                                        <p:cTn id="7" dur="500"/>
-                                        <p:tgtEl>
-                                          <p:spTgt spid="8"/>
-                                        </p:tgtEl>
-                                      </p:cBhvr>
-                                    </p:animEffect>
-                                  </p:childTnLst>
-                                </p:cTn>
-                              </p:par>
-                            </p:childTnLst>
-                          </p:cTn>
-                        </p:par>
-                      </p:childTnLst>
-                    </p:cTn>
-                  </p:par>
-                </p:childTnLst>
-              </p:cTn>
-              <p:prevCondLst>
-                <p:cond evt="onPrev" delay="0">
-                  <p:tgtEl>
-                    <p:sldTgt/>
-                  </p:tgtEl>
-                </p:cond>
-              </p:prevCondLst>
-              <p:nextCondLst>
-                <p:cond evt="onNext" delay="0">
-                  <p:tgtEl>
-                    <p:sldTgt/>
-                  </p:tgtEl>
-                </p:cond>
-              </p:nextCondLst>
-            </p:seq>
-          </p:childTnLst>
-        </p:cTn>
+        <p:cTn id="1" dur="indefinite" restart="never" nodeType="tmRoot"/>
       </p:par>
     </p:tnLst>
   </p:timing>
@@ -23769,86 +22923,7 @@
   <p:timing>
     <p:tnLst>
       <p:par>
-        <p:cTn id="1" dur="indefinite" restart="never" nodeType="tmRoot">
-          <p:childTnLst>
-            <p:seq concurrent="1" nextAc="seek">
-              <p:cTn id="2" dur="indefinite" nodeType="mainSeq">
-                <p:childTnLst>
-                  <p:par>
-                    <p:cTn id="3" fill="hold">
-                      <p:stCondLst>
-                        <p:cond delay="indefinite"/>
-                        <p:cond evt="onBegin" delay="0">
-                          <p:tn val="2"/>
-                        </p:cond>
-                      </p:stCondLst>
-                      <p:childTnLst>
-                        <p:par>
-                          <p:cTn id="4" fill="hold">
-                            <p:stCondLst>
-                              <p:cond delay="0"/>
-                            </p:stCondLst>
-                            <p:childTnLst>
-                              <p:par>
-                                <p:cTn id="5" presetID="10" presetClass="entr" presetSubtype="0" fill="hold" nodeType="afterEffect">
-                                  <p:stCondLst>
-                                    <p:cond delay="500"/>
-                                  </p:stCondLst>
-                                  <p:childTnLst>
-                                    <p:set>
-                                      <p:cBhvr>
-                                        <p:cTn id="6" dur="1" fill="hold">
-                                          <p:stCondLst>
-                                            <p:cond delay="0"/>
-                                          </p:stCondLst>
-                                        </p:cTn>
-                                        <p:tgtEl>
-                                          <p:spTgt spid="9"/>
-                                        </p:tgtEl>
-                                        <p:attrNameLst>
-                                          <p:attrName>style.visibility</p:attrName>
-                                        </p:attrNameLst>
-                                      </p:cBhvr>
-                                      <p:to>
-                                        <p:strVal val="visible"/>
-                                      </p:to>
-                                    </p:set>
-                                    <p:animEffect transition="in" filter="fade">
-                                      <p:cBhvr>
-                                        <p:cTn id="7" dur="500"/>
-                                        <p:tgtEl>
-                                          <p:spTgt spid="9"/>
-                                        </p:tgtEl>
-                                      </p:cBhvr>
-                                    </p:animEffect>
-                                  </p:childTnLst>
-                                </p:cTn>
-                              </p:par>
-                            </p:childTnLst>
-                          </p:cTn>
-                        </p:par>
-                      </p:childTnLst>
-                    </p:cTn>
-                  </p:par>
-                </p:childTnLst>
-              </p:cTn>
-              <p:prevCondLst>
-                <p:cond evt="onPrev" delay="0">
-                  <p:tgtEl>
-                    <p:sldTgt/>
-                  </p:tgtEl>
-                </p:cond>
-              </p:prevCondLst>
-              <p:nextCondLst>
-                <p:cond evt="onNext" delay="0">
-                  <p:tgtEl>
-                    <p:sldTgt/>
-                  </p:tgtEl>
-                </p:cond>
-              </p:nextCondLst>
-            </p:seq>
-          </p:childTnLst>
-        </p:cTn>
+        <p:cTn id="1" dur="indefinite" restart="never" nodeType="tmRoot"/>
       </p:par>
     </p:tnLst>
   </p:timing>
@@ -23983,86 +23058,7 @@
   <p:timing>
     <p:tnLst>
       <p:par>
-        <p:cTn id="1" dur="indefinite" restart="never" nodeType="tmRoot">
-          <p:childTnLst>
-            <p:seq concurrent="1" nextAc="seek">
-              <p:cTn id="2" dur="indefinite" nodeType="mainSeq">
-                <p:childTnLst>
-                  <p:par>
-                    <p:cTn id="3" fill="hold">
-                      <p:stCondLst>
-                        <p:cond delay="indefinite"/>
-                        <p:cond evt="onBegin" delay="0">
-                          <p:tn val="2"/>
-                        </p:cond>
-                      </p:stCondLst>
-                      <p:childTnLst>
-                        <p:par>
-                          <p:cTn id="4" fill="hold">
-                            <p:stCondLst>
-                              <p:cond delay="0"/>
-                            </p:stCondLst>
-                            <p:childTnLst>
-                              <p:par>
-                                <p:cTn id="5" presetID="10" presetClass="entr" presetSubtype="0" fill="hold" nodeType="afterEffect">
-                                  <p:stCondLst>
-                                    <p:cond delay="500"/>
-                                  </p:stCondLst>
-                                  <p:childTnLst>
-                                    <p:set>
-                                      <p:cBhvr>
-                                        <p:cTn id="6" dur="1" fill="hold">
-                                          <p:stCondLst>
-                                            <p:cond delay="0"/>
-                                          </p:stCondLst>
-                                        </p:cTn>
-                                        <p:tgtEl>
-                                          <p:spTgt spid="9"/>
-                                        </p:tgtEl>
-                                        <p:attrNameLst>
-                                          <p:attrName>style.visibility</p:attrName>
-                                        </p:attrNameLst>
-                                      </p:cBhvr>
-                                      <p:to>
-                                        <p:strVal val="visible"/>
-                                      </p:to>
-                                    </p:set>
-                                    <p:animEffect transition="in" filter="fade">
-                                      <p:cBhvr>
-                                        <p:cTn id="7" dur="500"/>
-                                        <p:tgtEl>
-                                          <p:spTgt spid="9"/>
-                                        </p:tgtEl>
-                                      </p:cBhvr>
-                                    </p:animEffect>
-                                  </p:childTnLst>
-                                </p:cTn>
-                              </p:par>
-                            </p:childTnLst>
-                          </p:cTn>
-                        </p:par>
-                      </p:childTnLst>
-                    </p:cTn>
-                  </p:par>
-                </p:childTnLst>
-              </p:cTn>
-              <p:prevCondLst>
-                <p:cond evt="onPrev" delay="0">
-                  <p:tgtEl>
-                    <p:sldTgt/>
-                  </p:tgtEl>
-                </p:cond>
-              </p:prevCondLst>
-              <p:nextCondLst>
-                <p:cond evt="onNext" delay="0">
-                  <p:tgtEl>
-                    <p:sldTgt/>
-                  </p:tgtEl>
-                </p:cond>
-              </p:nextCondLst>
-            </p:seq>
-          </p:childTnLst>
-        </p:cTn>
+        <p:cTn id="1" dur="indefinite" restart="never" nodeType="tmRoot"/>
       </p:par>
     </p:tnLst>
   </p:timing>
@@ -24310,129 +23306,9 @@
   <p:timing>
     <p:tnLst>
       <p:par>
-        <p:cTn id="1" dur="indefinite" restart="never" nodeType="tmRoot">
-          <p:childTnLst>
-            <p:seq concurrent="1" nextAc="seek">
-              <p:cTn id="2" dur="indefinite" nodeType="mainSeq">
-                <p:childTnLst>
-                  <p:par>
-                    <p:cTn id="3" fill="hold">
-                      <p:stCondLst>
-                        <p:cond delay="indefinite"/>
-                        <p:cond evt="onBegin" delay="0">
-                          <p:tn val="2"/>
-                        </p:cond>
-                      </p:stCondLst>
-                      <p:childTnLst>
-                        <p:par>
-                          <p:cTn id="4" fill="hold">
-                            <p:stCondLst>
-                              <p:cond delay="0"/>
-                            </p:stCondLst>
-                            <p:childTnLst>
-                              <p:par>
-                                <p:cTn id="5" presetID="2" presetClass="entr" presetSubtype="4" fill="hold" grpId="0" nodeType="afterEffect">
-                                  <p:stCondLst>
-                                    <p:cond delay="0"/>
-                                  </p:stCondLst>
-                                  <p:childTnLst>
-                                    <p:set>
-                                      <p:cBhvr>
-                                        <p:cTn id="6" dur="1" fill="hold">
-                                          <p:stCondLst>
-                                            <p:cond delay="0"/>
-                                          </p:stCondLst>
-                                        </p:cTn>
-                                        <p:tgtEl>
-                                          <p:spTgt spid="8"/>
-                                        </p:tgtEl>
-                                        <p:attrNameLst>
-                                          <p:attrName>style.visibility</p:attrName>
-                                        </p:attrNameLst>
-                                      </p:cBhvr>
-                                      <p:to>
-                                        <p:strVal val="visible"/>
-                                      </p:to>
-                                    </p:set>
-                                    <p:anim calcmode="lin" valueType="num">
-                                      <p:cBhvr additive="base">
-                                        <p:cTn id="7" dur="500" fill="hold"/>
-                                        <p:tgtEl>
-                                          <p:spTgt spid="8"/>
-                                        </p:tgtEl>
-                                        <p:attrNameLst>
-                                          <p:attrName>ppt_x</p:attrName>
-                                        </p:attrNameLst>
-                                      </p:cBhvr>
-                                      <p:tavLst>
-                                        <p:tav tm="0">
-                                          <p:val>
-                                            <p:strVal val="#ppt_x"/>
-                                          </p:val>
-                                        </p:tav>
-                                        <p:tav tm="100000">
-                                          <p:val>
-                                            <p:strVal val="#ppt_x"/>
-                                          </p:val>
-                                        </p:tav>
-                                      </p:tavLst>
-                                    </p:anim>
-                                    <p:anim calcmode="lin" valueType="num">
-                                      <p:cBhvr additive="base">
-                                        <p:cTn id="8" dur="500" fill="hold"/>
-                                        <p:tgtEl>
-                                          <p:spTgt spid="8"/>
-                                        </p:tgtEl>
-                                        <p:attrNameLst>
-                                          <p:attrName>ppt_y</p:attrName>
-                                        </p:attrNameLst>
-                                      </p:cBhvr>
-                                      <p:tavLst>
-                                        <p:tav tm="0">
-                                          <p:val>
-                                            <p:strVal val="1+#ppt_h/2"/>
-                                          </p:val>
-                                        </p:tav>
-                                        <p:tav tm="100000">
-                                          <p:val>
-                                            <p:strVal val="#ppt_y"/>
-                                          </p:val>
-                                        </p:tav>
-                                      </p:tavLst>
-                                    </p:anim>
-                                  </p:childTnLst>
-                                </p:cTn>
-                              </p:par>
-                            </p:childTnLst>
-                          </p:cTn>
-                        </p:par>
-                      </p:childTnLst>
-                    </p:cTn>
-                  </p:par>
-                </p:childTnLst>
-              </p:cTn>
-              <p:prevCondLst>
-                <p:cond evt="onPrev" delay="0">
-                  <p:tgtEl>
-                    <p:sldTgt/>
-                  </p:tgtEl>
-                </p:cond>
-              </p:prevCondLst>
-              <p:nextCondLst>
-                <p:cond evt="onNext" delay="0">
-                  <p:tgtEl>
-                    <p:sldTgt/>
-                  </p:tgtEl>
-                </p:cond>
-              </p:nextCondLst>
-            </p:seq>
-          </p:childTnLst>
-        </p:cTn>
+        <p:cTn id="1" dur="indefinite" restart="never" nodeType="tmRoot"/>
       </p:par>
     </p:tnLst>
-    <p:bldLst>
-      <p:bldP spid="8" grpId="0"/>
-    </p:bldLst>
   </p:timing>
 </p:sld>
 </file>
@@ -25340,6 +24216,61 @@
 </file>
 
 <file path=customXml/item1.xml><?xml version="1.0" encoding="utf-8"?>
+<?mso-contentType ?>
+<spe:Receivers xmlns:spe="http://schemas.microsoft.com/sharepoint/events">
+  <Receiver>
+    <Name>Document ID Generator</Name>
+    <Synchronization>Synchronous</Synchronization>
+    <Type>10001</Type>
+    <SequenceNumber>1000</SequenceNumber>
+    <Assembly>Microsoft.Office.DocumentManagement, Version=14.0.0.0, Culture=neutral, PublicKeyToken=71e9bce111e9429c</Assembly>
+    <Class>Microsoft.Office.DocumentManagement.Internal.DocIdHandler</Class>
+    <Data/>
+    <Filter/>
+  </Receiver>
+  <Receiver>
+    <Name>Document ID Generator</Name>
+    <Synchronization>Synchronous</Synchronization>
+    <Type>10002</Type>
+    <SequenceNumber>1001</SequenceNumber>
+    <Assembly>Microsoft.Office.DocumentManagement, Version=14.0.0.0, Culture=neutral, PublicKeyToken=71e9bce111e9429c</Assembly>
+    <Class>Microsoft.Office.DocumentManagement.Internal.DocIdHandler</Class>
+    <Data/>
+    <Filter/>
+  </Receiver>
+  <Receiver>
+    <Name>Document ID Generator</Name>
+    <Synchronization>Synchronous</Synchronization>
+    <Type>10004</Type>
+    <SequenceNumber>1002</SequenceNumber>
+    <Assembly>Microsoft.Office.DocumentManagement, Version=14.0.0.0, Culture=neutral, PublicKeyToken=71e9bce111e9429c</Assembly>
+    <Class>Microsoft.Office.DocumentManagement.Internal.DocIdHandler</Class>
+    <Data/>
+    <Filter/>
+  </Receiver>
+  <Receiver>
+    <Name>Document ID Generator</Name>
+    <Synchronization>Synchronous</Synchronization>
+    <Type>10006</Type>
+    <SequenceNumber>1003</SequenceNumber>
+    <Assembly>Microsoft.Office.DocumentManagement, Version=14.0.0.0, Culture=neutral, PublicKeyToken=71e9bce111e9429c</Assembly>
+    <Class>Microsoft.Office.DocumentManagement.Internal.DocIdHandler</Class>
+    <Data/>
+    <Filter/>
+  </Receiver>
+</spe:Receivers>
+</file>
+
+<file path=customXml/item2.xml><?xml version="1.0" encoding="utf-8"?>
+<?mso-contentType ?>
+<FormTemplates xmlns="http://schemas.microsoft.com/sharepoint/v3/contenttype/forms">
+  <Display>DocumentLibraryForm</Display>
+  <Edit>DocumentLibraryForm</Edit>
+  <New>DocumentLibraryForm</New>
+</FormTemplates>
+</file>
+
+<file path=customXml/item3.xml><?xml version="1.0" encoding="utf-8"?>
 <p:properties xmlns:p="http://schemas.microsoft.com/office/2006/metadata/properties" xmlns:xsi="http://www.w3.org/2001/XMLSchema-instance" xmlns:pc="http://schemas.microsoft.com/office/infopath/2007/PartnerControls">
   <documentManagement>
     <Description0 xmlns="1e37aee8-73ad-441e-bced-8b530ad9291b">PowerPoint template with Microsoft Partner Network logo on it.</Description0>
@@ -25352,7 +24283,7 @@
 </p:properties>
 </file>
 
-<file path=customXml/item2.xml><?xml version="1.0" encoding="utf-8"?>
+<file path=customXml/item4.xml><?xml version="1.0" encoding="utf-8"?>
 <ct:contentTypeSchema xmlns:ct="http://schemas.microsoft.com/office/2006/metadata/contentType" xmlns:ma="http://schemas.microsoft.com/office/2006/metadata/properties/metaAttributes" ct:_="" ma:_="" ma:contentTypeName="Document" ma:contentTypeID="0x0101004D2E750987EE2543B234B3A674D6BE3D" ma:contentTypeVersion="105" ma:contentTypeDescription="Create a new document." ma:contentTypeScope="" ma:versionID="62fa037737ae31885dcb260bd5c7d1f2">
   <xsd:schema xmlns:xsd="http://www.w3.org/2001/XMLSchema" xmlns:xs="http://www.w3.org/2001/XMLSchema" xmlns:p="http://schemas.microsoft.com/office/2006/metadata/properties" xmlns:ns2="1e37aee8-73ad-441e-bced-8b530ad9291b" xmlns:ns3="52ad97b0-86c1-49b5-b544-c488bf38e7c0" targetNamespace="http://schemas.microsoft.com/office/2006/metadata/properties" ma:root="true" ma:fieldsID="ce0d2501b4c25830d7e1734de94951c7" ns2:_="" ns3:_="">
     <xsd:import namespace="1e37aee8-73ad-441e-bced-8b530ad9291b"/>
@@ -25510,62 +24441,23 @@
 </ct:contentTypeSchema>
 </file>
 
-<file path=customXml/item3.xml><?xml version="1.0" encoding="utf-8"?>
-<?mso-contentType ?>
-<FormTemplates xmlns="http://schemas.microsoft.com/sharepoint/v3/contenttype/forms">
-  <Display>DocumentLibraryForm</Display>
-  <Edit>DocumentLibraryForm</Edit>
-  <New>DocumentLibraryForm</New>
-</FormTemplates>
+<file path=customXml/itemProps1.xml><?xml version="1.0" encoding="utf-8"?>
+<ds:datastoreItem xmlns:ds="http://schemas.openxmlformats.org/officeDocument/2006/customXml" ds:itemID="{0068A067-F354-4585-8169-FC99DA836E1C}">
+  <ds:schemaRefs>
+    <ds:schemaRef ds:uri="http://schemas.microsoft.com/sharepoint/events"/>
+  </ds:schemaRefs>
+</ds:datastoreItem>
 </file>
 
-<file path=customXml/item4.xml><?xml version="1.0" encoding="utf-8"?>
-<?mso-contentType ?>
-<spe:Receivers xmlns:spe="http://schemas.microsoft.com/sharepoint/events">
-  <Receiver>
-    <Name>Document ID Generator</Name>
-    <Synchronization>Synchronous</Synchronization>
-    <Type>10001</Type>
-    <SequenceNumber>1000</SequenceNumber>
-    <Assembly>Microsoft.Office.DocumentManagement, Version=14.0.0.0, Culture=neutral, PublicKeyToken=71e9bce111e9429c</Assembly>
-    <Class>Microsoft.Office.DocumentManagement.Internal.DocIdHandler</Class>
-    <Data/>
-    <Filter/>
-  </Receiver>
-  <Receiver>
-    <Name>Document ID Generator</Name>
-    <Synchronization>Synchronous</Synchronization>
-    <Type>10002</Type>
-    <SequenceNumber>1001</SequenceNumber>
-    <Assembly>Microsoft.Office.DocumentManagement, Version=14.0.0.0, Culture=neutral, PublicKeyToken=71e9bce111e9429c</Assembly>
-    <Class>Microsoft.Office.DocumentManagement.Internal.DocIdHandler</Class>
-    <Data/>
-    <Filter/>
-  </Receiver>
-  <Receiver>
-    <Name>Document ID Generator</Name>
-    <Synchronization>Synchronous</Synchronization>
-    <Type>10004</Type>
-    <SequenceNumber>1002</SequenceNumber>
-    <Assembly>Microsoft.Office.DocumentManagement, Version=14.0.0.0, Culture=neutral, PublicKeyToken=71e9bce111e9429c</Assembly>
-    <Class>Microsoft.Office.DocumentManagement.Internal.DocIdHandler</Class>
-    <Data/>
-    <Filter/>
-  </Receiver>
-  <Receiver>
-    <Name>Document ID Generator</Name>
-    <Synchronization>Synchronous</Synchronization>
-    <Type>10006</Type>
-    <SequenceNumber>1003</SequenceNumber>
-    <Assembly>Microsoft.Office.DocumentManagement, Version=14.0.0.0, Culture=neutral, PublicKeyToken=71e9bce111e9429c</Assembly>
-    <Class>Microsoft.Office.DocumentManagement.Internal.DocIdHandler</Class>
-    <Data/>
-    <Filter/>
-  </Receiver>
-</spe:Receivers>
+<file path=customXml/itemProps2.xml><?xml version="1.0" encoding="utf-8"?>
+<ds:datastoreItem xmlns:ds="http://schemas.openxmlformats.org/officeDocument/2006/customXml" ds:itemID="{B6DBE1C9-0895-41F8-89A3-98DC40E912B0}">
+  <ds:schemaRefs>
+    <ds:schemaRef ds:uri="http://schemas.microsoft.com/sharepoint/v3/contenttype/forms"/>
+  </ds:schemaRefs>
+</ds:datastoreItem>
 </file>
 
-<file path=customXml/itemProps1.xml><?xml version="1.0" encoding="utf-8"?>
+<file path=customXml/itemProps3.xml><?xml version="1.0" encoding="utf-8"?>
 <ds:datastoreItem xmlns:ds="http://schemas.openxmlformats.org/officeDocument/2006/customXml" ds:itemID="{9F5040E5-4564-49C1-9147-56F1700A1C56}">
   <ds:schemaRefs>
     <ds:schemaRef ds:uri="http://purl.org/dc/terms/"/>
@@ -25582,7 +24474,7 @@
 </ds:datastoreItem>
 </file>
 
-<file path=customXml/itemProps2.xml><?xml version="1.0" encoding="utf-8"?>
+<file path=customXml/itemProps4.xml><?xml version="1.0" encoding="utf-8"?>
 <ds:datastoreItem xmlns:ds="http://schemas.openxmlformats.org/officeDocument/2006/customXml" ds:itemID="{B03FC495-EB61-4A2C-B8E7-345CEB92DF9F}">
   <ds:schemaRefs>
     <ds:schemaRef ds:uri="http://schemas.microsoft.com/office/2006/metadata/contentType"/>
@@ -25599,20 +24491,4 @@
     <ds:schemaRef ds:uri="http://schemas.microsoft.com/internal/obd"/>
   </ds:schemaRefs>
 </ds:datastoreItem>
-</file>
-
-<file path=customXml/itemProps3.xml><?xml version="1.0" encoding="utf-8"?>
-<ds:datastoreItem xmlns:ds="http://schemas.openxmlformats.org/officeDocument/2006/customXml" ds:itemID="{B6DBE1C9-0895-41F8-89A3-98DC40E912B0}">
-  <ds:schemaRefs>
-    <ds:schemaRef ds:uri="http://schemas.microsoft.com/sharepoint/v3/contenttype/forms"/>
-  </ds:schemaRefs>
-</ds:datastoreItem>
-</file>
-
-<file path=customXml/itemProps4.xml><?xml version="1.0" encoding="utf-8"?>
-<ds:datastoreItem xmlns:ds="http://schemas.openxmlformats.org/officeDocument/2006/customXml" ds:itemID="{0068A067-F354-4585-8169-FC99DA836E1C}">
-  <ds:schemaRefs>
-    <ds:schemaRef ds:uri="http://schemas.microsoft.com/sharepoint/events"/>
-  </ds:schemaRefs>
-</ds:datastoreItem>
 </file>
</xml_diff>